<commit_message>
No changes made, but I added comments.
</commit_message>
<xml_diff>
--- a/ECE411 - Final Presentation.pptx
+++ b/ECE411 - Final Presentation.pptx
@@ -136,6 +136,172 @@
 </p:presentation>
 </file>
 
+<file path=ppt/commentAuthors.xml><?xml version="1.0" encoding="utf-8"?>
+<p:cmAuthorLst xmlns:a="http://schemas.openxmlformats.org/drawingml/2006/main" xmlns:r="http://schemas.openxmlformats.org/officeDocument/2006/relationships" xmlns:p="http://schemas.openxmlformats.org/presentationml/2006/main">
+  <p:cmAuthor id="1" name="Dwayne Hoeck" initials="DH" lastIdx="11" clrIdx="0">
+    <p:extLst>
+      <p:ext uri="{19B8F6BF-5375-455C-9EA6-DF929625EA0E}">
+        <p15:presenceInfo xmlns:p15="http://schemas.microsoft.com/office/powerpoint/2012/main" userId="677f8cdd6cf8b7f7" providerId="Windows Live"/>
+      </p:ext>
+    </p:extLst>
+  </p:cmAuthor>
+</p:cmAuthorLst>
+</file>
+
+<file path=ppt/comments/comment1.xml><?xml version="1.0" encoding="utf-8"?>
+<p:cmLst xmlns:a="http://schemas.openxmlformats.org/drawingml/2006/main" xmlns:r="http://schemas.openxmlformats.org/officeDocument/2006/relationships" xmlns:p="http://schemas.openxmlformats.org/presentationml/2006/main">
+  <p:cm authorId="1" dt="2016-12-08T11:32:40.414" idx="4">
+    <p:pos x="10" y="10"/>
+    <p:text>How are we breaking up who presents what material?</p:text>
+    <p:extLst>
+      <p:ext uri="{C676402C-5697-4E1C-873F-D02D1690AC5C}">
+        <p15:threadingInfo xmlns:p15="http://schemas.microsoft.com/office/powerpoint/2012/main" timeZoneBias="480"/>
+      </p:ext>
+    </p:extLst>
+  </p:cm>
+</p:cmLst>
+</file>
+
+<file path=ppt/comments/comment10.xml><?xml version="1.0" encoding="utf-8"?>
+<p:cmLst xmlns:a="http://schemas.openxmlformats.org/drawingml/2006/main" xmlns:r="http://schemas.openxmlformats.org/officeDocument/2006/relationships" xmlns:p="http://schemas.openxmlformats.org/presentationml/2006/main">
+  <p:cm authorId="1" dt="2016-12-08T11:45:27.270" idx="10">
+    <p:pos x="10" y="10"/>
+    <p:text>Insert pic</p:text>
+    <p:extLst>
+      <p:ext uri="{C676402C-5697-4E1C-873F-D02D1690AC5C}">
+        <p15:threadingInfo xmlns:p15="http://schemas.microsoft.com/office/powerpoint/2012/main" timeZoneBias="480"/>
+      </p:ext>
+    </p:extLst>
+  </p:cm>
+</p:cmLst>
+</file>
+
+<file path=ppt/comments/comment11.xml><?xml version="1.0" encoding="utf-8"?>
+<p:cmLst xmlns:a="http://schemas.openxmlformats.org/drawingml/2006/main" xmlns:r="http://schemas.openxmlformats.org/officeDocument/2006/relationships" xmlns:p="http://schemas.openxmlformats.org/presentationml/2006/main">
+  <p:cm authorId="1" dt="2016-12-08T11:45:42.655" idx="11">
+    <p:pos x="10" y="10"/>
+    <p:text>"Contributions and Lessons Learned"</p:text>
+    <p:extLst>
+      <p:ext uri="{C676402C-5697-4E1C-873F-D02D1690AC5C}">
+        <p15:threadingInfo xmlns:p15="http://schemas.microsoft.com/office/powerpoint/2012/main" timeZoneBias="480"/>
+      </p:ext>
+    </p:extLst>
+  </p:cm>
+</p:cmLst>
+</file>
+
+<file path=ppt/comments/comment2.xml><?xml version="1.0" encoding="utf-8"?>
+<p:cmLst xmlns:a="http://schemas.openxmlformats.org/drawingml/2006/main" xmlns:r="http://schemas.openxmlformats.org/officeDocument/2006/relationships" xmlns:p="http://schemas.openxmlformats.org/presentationml/2006/main">
+  <p:cm authorId="1" dt="2016-12-08T11:28:15.208" idx="2">
+    <p:pos x="10" y="10"/>
+    <p:text>"Need and Motivation" - we should be prepared to answer why this box does not meen the requirement "not identifiable as a lockbox at first glance."</p:text>
+    <p:extLst>
+      <p:ext uri="{C676402C-5697-4E1C-873F-D02D1690AC5C}">
+        <p15:threadingInfo xmlns:p15="http://schemas.microsoft.com/office/powerpoint/2012/main" timeZoneBias="480"/>
+      </p:ext>
+    </p:extLst>
+  </p:cm>
+</p:cmLst>
+</file>
+
+<file path=ppt/comments/comment3.xml><?xml version="1.0" encoding="utf-8"?>
+<p:cmLst xmlns:a="http://schemas.openxmlformats.org/drawingml/2006/main" xmlns:r="http://schemas.openxmlformats.org/officeDocument/2006/relationships" xmlns:p="http://schemas.openxmlformats.org/presentationml/2006/main">
+  <p:cm authorId="1" dt="2016-12-08T11:30:31.126" idx="3">
+    <p:pos x="10" y="10"/>
+    <p:text>"Test" section needs "input admin code" (maybe?)</p:text>
+    <p:extLst>
+      <p:ext uri="{C676402C-5697-4E1C-873F-D02D1690AC5C}">
+        <p15:threadingInfo xmlns:p15="http://schemas.microsoft.com/office/powerpoint/2012/main" timeZoneBias="480"/>
+      </p:ext>
+    </p:extLst>
+  </p:cm>
+</p:cmLst>
+</file>
+
+<file path=ppt/comments/comment4.xml><?xml version="1.0" encoding="utf-8"?>
+<p:cmLst xmlns:a="http://schemas.openxmlformats.org/drawingml/2006/main" xmlns:r="http://schemas.openxmlformats.org/officeDocument/2006/relationships" xmlns:p="http://schemas.openxmlformats.org/presentationml/2006/main">
+  <p:cm authorId="1" dt="2016-12-08T11:33:30.971" idx="5">
+    <p:pos x="10" y="10"/>
+    <p:text>Should we give some details pertaining to how we chose Microsoft Project and how we maintained the schedule?</p:text>
+    <p:extLst>
+      <p:ext uri="{C676402C-5697-4E1C-873F-D02D1690AC5C}">
+        <p15:threadingInfo xmlns:p15="http://schemas.microsoft.com/office/powerpoint/2012/main" timeZoneBias="480"/>
+      </p:ext>
+    </p:extLst>
+  </p:cm>
+</p:cmLst>
+</file>
+
+<file path=ppt/comments/comment5.xml><?xml version="1.0" encoding="utf-8"?>
+<p:cmLst xmlns:a="http://schemas.openxmlformats.org/drawingml/2006/main" xmlns:r="http://schemas.openxmlformats.org/officeDocument/2006/relationships" xmlns:p="http://schemas.openxmlformats.org/presentationml/2006/main">
+  <p:cm authorId="1" dt="2016-12-08T11:34:43.580" idx="6">
+    <p:pos x="10" y="10"/>
+    <p:text>Do we want to specify that it was Atmel Studio? They are almost the same thing, but should we be explicit?</p:text>
+    <p:extLst>
+      <p:ext uri="{C676402C-5697-4E1C-873F-D02D1690AC5C}">
+        <p15:threadingInfo xmlns:p15="http://schemas.microsoft.com/office/powerpoint/2012/main" timeZoneBias="480"/>
+      </p:ext>
+    </p:extLst>
+  </p:cm>
+</p:cmLst>
+</file>
+
+<file path=ppt/comments/comment6.xml><?xml version="1.0" encoding="utf-8"?>
+<p:cmLst xmlns:a="http://schemas.openxmlformats.org/drawingml/2006/main" xmlns:r="http://schemas.openxmlformats.org/officeDocument/2006/relationships" xmlns:p="http://schemas.openxmlformats.org/presentationml/2006/main">
+  <p:cm authorId="1" dt="2016-12-08T11:42:22.565" idx="7">
+    <p:pos x="10" y="10"/>
+    <p:text>"Picture for main component go here"</p:text>
+    <p:extLst>
+      <p:ext uri="{C676402C-5697-4E1C-873F-D02D1690AC5C}">
+        <p15:threadingInfo xmlns:p15="http://schemas.microsoft.com/office/powerpoint/2012/main" timeZoneBias="480"/>
+      </p:ext>
+    </p:extLst>
+  </p:cm>
+</p:cmLst>
+</file>
+
+<file path=ppt/comments/comment7.xml><?xml version="1.0" encoding="utf-8"?>
+<p:cmLst xmlns:a="http://schemas.openxmlformats.org/drawingml/2006/main" xmlns:r="http://schemas.openxmlformats.org/officeDocument/2006/relationships" xmlns:p="http://schemas.openxmlformats.org/presentationml/2006/main">
+  <p:cm authorId="1" dt="2016-12-08T11:27:04.767" idx="1">
+    <p:pos x="964" y="505"/>
+    <p:text>Previous slide has dash: "Implementation - Schematic." We should make them consistent.</p:text>
+    <p:extLst>
+      <p:ext uri="{C676402C-5697-4E1C-873F-D02D1690AC5C}">
+        <p15:threadingInfo xmlns:p15="http://schemas.microsoft.com/office/powerpoint/2012/main" timeZoneBias="480"/>
+      </p:ext>
+    </p:extLst>
+  </p:cm>
+</p:cmLst>
+</file>
+
+<file path=ppt/comments/comment8.xml><?xml version="1.0" encoding="utf-8"?>
+<p:cmLst xmlns:a="http://schemas.openxmlformats.org/drawingml/2006/main" xmlns:r="http://schemas.openxmlformats.org/officeDocument/2006/relationships" xmlns:p="http://schemas.openxmlformats.org/presentationml/2006/main">
+  <p:cm authorId="1" dt="2016-12-08T11:43:42.635" idx="8">
+    <p:pos x="10" y="10"/>
+    <p:text>"Bill of materials" should just be "bill of materials."</p:text>
+    <p:extLst>
+      <p:ext uri="{C676402C-5697-4E1C-873F-D02D1690AC5C}">
+        <p15:threadingInfo xmlns:p15="http://schemas.microsoft.com/office/powerpoint/2012/main" timeZoneBias="480"/>
+      </p:ext>
+    </p:extLst>
+  </p:cm>
+</p:cmLst>
+</file>
+
+<file path=ppt/comments/comment9.xml><?xml version="1.0" encoding="utf-8"?>
+<p:cmLst xmlns:a="http://schemas.openxmlformats.org/drawingml/2006/main" xmlns:r="http://schemas.openxmlformats.org/officeDocument/2006/relationships" xmlns:p="http://schemas.openxmlformats.org/presentationml/2006/main">
+  <p:cm authorId="1" dt="2016-12-08T11:44:34.676" idx="9">
+    <p:pos x="10" y="10"/>
+    <p:text>Was the first lock box really only invented 55 years ago?</p:text>
+    <p:extLst>
+      <p:ext uri="{C676402C-5697-4E1C-873F-D02D1690AC5C}">
+        <p15:threadingInfo xmlns:p15="http://schemas.microsoft.com/office/powerpoint/2012/main" timeZoneBias="480"/>
+      </p:ext>
+    </p:extLst>
+  </p:cm>
+</p:cmLst>
+</file>
+
 <file path=ppt/notesMasters/notesMaster1.xml><?xml version="1.0" encoding="utf-8"?>
 <p:notesMaster xmlns:a="http://schemas.openxmlformats.org/drawingml/2006/main" xmlns:r="http://schemas.openxmlformats.org/officeDocument/2006/relationships" xmlns:p="http://schemas.openxmlformats.org/presentationml/2006/main">
   <p:cSld>
@@ -218,7 +384,7 @@
           <a:p>
             <a:fld id="{AF9CE80A-28B5-E142-9734-8F3A89166F8B}" type="datetimeFigureOut">
               <a:rPr lang="en-US" smtClean="0"/>
-              <a:t>12/8/16</a:t>
+              <a:t>12/8/2016</a:t>
             </a:fld>
             <a:endParaRPr lang="en-US"/>
           </a:p>
@@ -282,38 +448,37 @@
           <a:p>
             <a:pPr lvl="0"/>
             <a:r>
-              <a:rPr lang="en-US" smtClean="0"/>
+              <a:rPr lang="en-US"/>
               <a:t>Click to edit Master text styles</a:t>
             </a:r>
           </a:p>
           <a:p>
             <a:pPr lvl="1"/>
             <a:r>
-              <a:rPr lang="en-US" smtClean="0"/>
+              <a:rPr lang="en-US"/>
               <a:t>Second level</a:t>
             </a:r>
           </a:p>
           <a:p>
             <a:pPr lvl="2"/>
             <a:r>
-              <a:rPr lang="en-US" smtClean="0"/>
+              <a:rPr lang="en-US"/>
               <a:t>Third level</a:t>
             </a:r>
           </a:p>
           <a:p>
             <a:pPr lvl="3"/>
             <a:r>
-              <a:rPr lang="en-US" smtClean="0"/>
+              <a:rPr lang="en-US"/>
               <a:t>Fourth level</a:t>
             </a:r>
           </a:p>
           <a:p>
             <a:pPr lvl="4"/>
             <a:r>
-              <a:rPr lang="en-US" smtClean="0"/>
+              <a:rPr lang="en-US"/>
               <a:t>Fifth level</a:t>
             </a:r>
-            <a:endParaRPr lang="en-US"/>
           </a:p>
         </p:txBody>
       </p:sp>
@@ -669,7 +834,7 @@
           </a:lstStyle>
           <a:p>
             <a:r>
-              <a:rPr lang="en-US" smtClean="0"/>
+              <a:rPr lang="en-US"/>
               <a:t>Click to edit Master title style</a:t>
             </a:r>
             <a:endParaRPr lang="en-US" dirty="0"/>
@@ -736,7 +901,7 @@
           </a:lstStyle>
           <a:p>
             <a:r>
-              <a:rPr lang="en-US" smtClean="0"/>
+              <a:rPr lang="en-US"/>
               <a:t>Click to edit Master subtitle style</a:t>
             </a:r>
             <a:endParaRPr lang="en-US" dirty="0"/>
@@ -760,7 +925,7 @@
           <a:p>
             <a:fld id="{CEF241BB-F2B7-4B67-A396-DB168B131349}" type="datetimeFigureOut">
               <a:rPr lang="en-US" smtClean="0"/>
-              <a:t>12/8/16</a:t>
+              <a:t>12/8/2016</a:t>
             </a:fld>
             <a:endParaRPr lang="en-US"/>
           </a:p>
@@ -882,7 +1047,7 @@
           <p:nvPr/>
         </p:nvPicPr>
         <p:blipFill>
-          <a:blip r:embed="rId3">
+          <a:blip r:embed="rId3" cstate="print">
             <a:extLst>
               <a:ext uri="{28A0092B-C50C-407E-A947-70E740481C1C}">
                 <a14:useLocalDpi xmlns:a14="http://schemas.microsoft.com/office/drawing/2010/main" val="0"/>
@@ -1009,7 +1174,7 @@
           </a:lstStyle>
           <a:p>
             <a:r>
-              <a:rPr lang="en-US" smtClean="0"/>
+              <a:rPr lang="en-US"/>
               <a:t>Click to edit Master title style</a:t>
             </a:r>
             <a:endParaRPr lang="en-US" dirty="0"/>
@@ -1085,7 +1250,7 @@
           </a:lstStyle>
           <a:p>
             <a:r>
-              <a:rPr lang="en-US" smtClean="0"/>
+              <a:rPr lang="en-US"/>
               <a:t>Drag picture to placeholder or click icon to add</a:t>
             </a:r>
             <a:endParaRPr lang="en-US" dirty="0"/>
@@ -1151,7 +1316,7 @@
           <a:p>
             <a:pPr lvl="0"/>
             <a:r>
-              <a:rPr lang="en-US" smtClean="0"/>
+              <a:rPr lang="en-US"/>
               <a:t>Click to edit Master text styles</a:t>
             </a:r>
           </a:p>
@@ -1174,7 +1339,7 @@
           <a:p>
             <a:fld id="{CEF241BB-F2B7-4B67-A396-DB168B131349}" type="datetimeFigureOut">
               <a:rPr lang="en-US" smtClean="0"/>
-              <a:t>12/8/16</a:t>
+              <a:t>12/8/2016</a:t>
             </a:fld>
             <a:endParaRPr lang="en-US"/>
           </a:p>
@@ -1291,7 +1456,7 @@
           <p:nvPr/>
         </p:nvPicPr>
         <p:blipFill>
-          <a:blip r:embed="rId3">
+          <a:blip r:embed="rId3" cstate="print">
             <a:extLst>
               <a:ext uri="{28A0092B-C50C-407E-A947-70E740481C1C}">
                 <a14:useLocalDpi xmlns:a14="http://schemas.microsoft.com/office/drawing/2010/main" val="0"/>
@@ -1416,7 +1581,7 @@
           </a:lstStyle>
           <a:p>
             <a:r>
-              <a:rPr lang="en-US" smtClean="0"/>
+              <a:rPr lang="en-US"/>
               <a:t>Click to edit Master title style</a:t>
             </a:r>
             <a:endParaRPr lang="en-US" dirty="0"/>
@@ -1482,7 +1647,7 @@
           <a:p>
             <a:pPr lvl="0"/>
             <a:r>
-              <a:rPr lang="en-US" smtClean="0"/>
+              <a:rPr lang="en-US"/>
               <a:t>Click to edit Master text styles</a:t>
             </a:r>
           </a:p>
@@ -1505,7 +1670,7 @@
           <a:p>
             <a:fld id="{CEF241BB-F2B7-4B67-A396-DB168B131349}" type="datetimeFigureOut">
               <a:rPr lang="en-US" smtClean="0"/>
-              <a:t>12/8/16</a:t>
+              <a:t>12/8/2016</a:t>
             </a:fld>
             <a:endParaRPr lang="en-US"/>
           </a:p>
@@ -1622,7 +1787,7 @@
           <p:nvPr/>
         </p:nvPicPr>
         <p:blipFill>
-          <a:blip r:embed="rId3">
+          <a:blip r:embed="rId3" cstate="print">
             <a:extLst>
               <a:ext uri="{28A0092B-C50C-407E-A947-70E740481C1C}">
                 <a14:useLocalDpi xmlns:a14="http://schemas.microsoft.com/office/drawing/2010/main" val="0"/>
@@ -1747,7 +1912,7 @@
           </a:lstStyle>
           <a:p>
             <a:r>
-              <a:rPr lang="en-US" smtClean="0"/>
+              <a:rPr lang="en-US"/>
               <a:t>Click to edit Master title style</a:t>
             </a:r>
             <a:endParaRPr lang="en-US" dirty="0"/>
@@ -1815,7 +1980,7 @@
           <a:p>
             <a:pPr lvl="0"/>
             <a:r>
-              <a:rPr lang="en-US" smtClean="0"/>
+              <a:rPr lang="en-US"/>
               <a:t>Click to edit Master text styles</a:t>
             </a:r>
           </a:p>
@@ -1882,7 +2047,7 @@
           <a:p>
             <a:pPr lvl="0"/>
             <a:r>
-              <a:rPr lang="en-US" smtClean="0"/>
+              <a:rPr lang="en-US"/>
               <a:t>Click to edit Master text styles</a:t>
             </a:r>
           </a:p>
@@ -1905,7 +2070,7 @@
           <a:p>
             <a:fld id="{CEF241BB-F2B7-4B67-A396-DB168B131349}" type="datetimeFigureOut">
               <a:rPr lang="en-US" smtClean="0"/>
-              <a:t>12/8/16</a:t>
+              <a:t>12/8/2016</a:t>
             </a:fld>
             <a:endParaRPr lang="en-US"/>
           </a:p>
@@ -2254,7 +2419,7 @@
           <p:nvPr/>
         </p:nvPicPr>
         <p:blipFill>
-          <a:blip r:embed="rId3">
+          <a:blip r:embed="rId3" cstate="print">
             <a:extLst>
               <a:ext uri="{28A0092B-C50C-407E-A947-70E740481C1C}">
                 <a14:useLocalDpi xmlns:a14="http://schemas.microsoft.com/office/drawing/2010/main" val="0"/>
@@ -2379,7 +2544,7 @@
           </a:lstStyle>
           <a:p>
             <a:r>
-              <a:rPr lang="en-US" smtClean="0"/>
+              <a:rPr lang="en-US"/>
               <a:t>Click to edit Master title style</a:t>
             </a:r>
             <a:endParaRPr lang="en-US" dirty="0"/>
@@ -2445,7 +2610,7 @@
           <a:p>
             <a:pPr lvl="0"/>
             <a:r>
-              <a:rPr lang="en-US" smtClean="0"/>
+              <a:rPr lang="en-US"/>
               <a:t>Click to edit Master text styles</a:t>
             </a:r>
           </a:p>
@@ -2468,7 +2633,7 @@
           <a:p>
             <a:fld id="{CEF241BB-F2B7-4B67-A396-DB168B131349}" type="datetimeFigureOut">
               <a:rPr lang="en-US" smtClean="0"/>
-              <a:t>12/8/16</a:t>
+              <a:t>12/8/2016</a:t>
             </a:fld>
             <a:endParaRPr lang="en-US"/>
           </a:p>
@@ -2585,7 +2750,7 @@
           <p:nvPr/>
         </p:nvPicPr>
         <p:blipFill>
-          <a:blip r:embed="rId3">
+          <a:blip r:embed="rId3" cstate="print">
             <a:extLst>
               <a:ext uri="{28A0092B-C50C-407E-A947-70E740481C1C}">
                 <a14:useLocalDpi xmlns:a14="http://schemas.microsoft.com/office/drawing/2010/main" val="0"/>
@@ -2706,7 +2871,7 @@
           <a:lstStyle/>
           <a:p>
             <a:r>
-              <a:rPr lang="en-US" smtClean="0"/>
+              <a:rPr lang="en-US"/>
               <a:t>Click to edit Master title style</a:t>
             </a:r>
             <a:endParaRPr lang="en-US" dirty="0"/>
@@ -2778,7 +2943,7 @@
           <a:p>
             <a:pPr lvl="0"/>
             <a:r>
-              <a:rPr lang="en-US" smtClean="0"/>
+              <a:rPr lang="en-US"/>
               <a:t>Click to edit Master text styles</a:t>
             </a:r>
           </a:p>
@@ -2845,7 +3010,7 @@
           <a:p>
             <a:pPr lvl="0"/>
             <a:r>
-              <a:rPr lang="en-US" smtClean="0"/>
+              <a:rPr lang="en-US"/>
               <a:t>Click to edit Master text styles</a:t>
             </a:r>
           </a:p>
@@ -2916,7 +3081,7 @@
           <a:p>
             <a:pPr lvl="0"/>
             <a:r>
-              <a:rPr lang="en-US" smtClean="0"/>
+              <a:rPr lang="en-US"/>
               <a:t>Click to edit Master text styles</a:t>
             </a:r>
           </a:p>
@@ -2983,7 +3148,7 @@
           <a:p>
             <a:pPr lvl="0"/>
             <a:r>
-              <a:rPr lang="en-US" smtClean="0"/>
+              <a:rPr lang="en-US"/>
               <a:t>Click to edit Master text styles</a:t>
             </a:r>
           </a:p>
@@ -3054,7 +3219,7 @@
           <a:p>
             <a:pPr lvl="0"/>
             <a:r>
-              <a:rPr lang="en-US" smtClean="0"/>
+              <a:rPr lang="en-US"/>
               <a:t>Click to edit Master text styles</a:t>
             </a:r>
           </a:p>
@@ -3121,7 +3286,7 @@
           <a:p>
             <a:pPr lvl="0"/>
             <a:r>
-              <a:rPr lang="en-US" smtClean="0"/>
+              <a:rPr lang="en-US"/>
               <a:t>Click to edit Master text styles</a:t>
             </a:r>
           </a:p>
@@ -3144,7 +3309,7 @@
           <a:p>
             <a:fld id="{CEF241BB-F2B7-4B67-A396-DB168B131349}" type="datetimeFigureOut">
               <a:rPr lang="en-US" smtClean="0"/>
-              <a:t>12/8/16</a:t>
+              <a:t>12/8/2016</a:t>
             </a:fld>
             <a:endParaRPr lang="en-US"/>
           </a:p>
@@ -3256,7 +3421,7 @@
           <p:nvPr/>
         </p:nvPicPr>
         <p:blipFill>
-          <a:blip r:embed="rId3">
+          <a:blip r:embed="rId3" cstate="print">
             <a:extLst>
               <a:ext uri="{28A0092B-C50C-407E-A947-70E740481C1C}">
                 <a14:useLocalDpi xmlns:a14="http://schemas.microsoft.com/office/drawing/2010/main" val="0"/>
@@ -3377,7 +3542,7 @@
           <a:lstStyle/>
           <a:p>
             <a:r>
-              <a:rPr lang="en-US" smtClean="0"/>
+              <a:rPr lang="en-US"/>
               <a:t>Click to edit Master title style</a:t>
             </a:r>
             <a:endParaRPr lang="en-US" dirty="0"/>
@@ -3449,7 +3614,7 @@
           <a:p>
             <a:pPr lvl="0"/>
             <a:r>
-              <a:rPr lang="en-US" smtClean="0"/>
+              <a:rPr lang="en-US"/>
               <a:t>Click to edit Master text styles</a:t>
             </a:r>
           </a:p>
@@ -3527,7 +3692,7 @@
           </a:lstStyle>
           <a:p>
             <a:r>
-              <a:rPr lang="en-US" smtClean="0"/>
+              <a:rPr lang="en-US"/>
               <a:t>Drag picture to placeholder or click icon to add</a:t>
             </a:r>
             <a:endParaRPr lang="en-US" dirty="0"/>
@@ -3595,7 +3760,7 @@
           <a:p>
             <a:pPr lvl="0"/>
             <a:r>
-              <a:rPr lang="en-US" smtClean="0"/>
+              <a:rPr lang="en-US"/>
               <a:t>Click to edit Master text styles</a:t>
             </a:r>
           </a:p>
@@ -3666,7 +3831,7 @@
           <a:p>
             <a:pPr lvl="0"/>
             <a:r>
-              <a:rPr lang="en-US" smtClean="0"/>
+              <a:rPr lang="en-US"/>
               <a:t>Click to edit Master text styles</a:t>
             </a:r>
           </a:p>
@@ -3744,7 +3909,7 @@
           </a:lstStyle>
           <a:p>
             <a:r>
-              <a:rPr lang="en-US" smtClean="0"/>
+              <a:rPr lang="en-US"/>
               <a:t>Drag picture to placeholder or click icon to add</a:t>
             </a:r>
             <a:endParaRPr lang="en-US" dirty="0"/>
@@ -3812,7 +3977,7 @@
           <a:p>
             <a:pPr lvl="0"/>
             <a:r>
-              <a:rPr lang="en-US" smtClean="0"/>
+              <a:rPr lang="en-US"/>
               <a:t>Click to edit Master text styles</a:t>
             </a:r>
           </a:p>
@@ -3883,7 +4048,7 @@
           <a:p>
             <a:pPr lvl="0"/>
             <a:r>
-              <a:rPr lang="en-US" smtClean="0"/>
+              <a:rPr lang="en-US"/>
               <a:t>Click to edit Master text styles</a:t>
             </a:r>
           </a:p>
@@ -3961,7 +4126,7 @@
           </a:lstStyle>
           <a:p>
             <a:r>
-              <a:rPr lang="en-US" smtClean="0"/>
+              <a:rPr lang="en-US"/>
               <a:t>Drag picture to placeholder or click icon to add</a:t>
             </a:r>
             <a:endParaRPr lang="en-US" dirty="0"/>
@@ -4029,7 +4194,7 @@
           <a:p>
             <a:pPr lvl="0"/>
             <a:r>
-              <a:rPr lang="en-US" smtClean="0"/>
+              <a:rPr lang="en-US"/>
               <a:t>Click to edit Master text styles</a:t>
             </a:r>
           </a:p>
@@ -4052,7 +4217,7 @@
           <a:p>
             <a:fld id="{CEF241BB-F2B7-4B67-A396-DB168B131349}" type="datetimeFigureOut">
               <a:rPr lang="en-US" smtClean="0"/>
-              <a:t>12/8/16</a:t>
+              <a:t>12/8/2016</a:t>
             </a:fld>
             <a:endParaRPr lang="en-US"/>
           </a:p>
@@ -4164,7 +4329,7 @@
           <p:nvPr/>
         </p:nvPicPr>
         <p:blipFill>
-          <a:blip r:embed="rId3">
+          <a:blip r:embed="rId3" cstate="print">
             <a:extLst>
               <a:ext uri="{28A0092B-C50C-407E-A947-70E740481C1C}">
                 <a14:useLocalDpi xmlns:a14="http://schemas.microsoft.com/office/drawing/2010/main" val="0"/>
@@ -4284,7 +4449,7 @@
           </a:lstStyle>
           <a:p>
             <a:r>
-              <a:rPr lang="en-US" smtClean="0"/>
+              <a:rPr lang="en-US"/>
               <a:t>Click to edit Master title style</a:t>
             </a:r>
             <a:endParaRPr lang="en-US" dirty="0"/>
@@ -4308,35 +4473,35 @@
           <a:p>
             <a:pPr lvl="0"/>
             <a:r>
-              <a:rPr lang="en-US" smtClean="0"/>
+              <a:rPr lang="en-US"/>
               <a:t>Click to edit Master text styles</a:t>
             </a:r>
           </a:p>
           <a:p>
             <a:pPr lvl="1"/>
             <a:r>
-              <a:rPr lang="en-US" smtClean="0"/>
+              <a:rPr lang="en-US"/>
               <a:t>Second level</a:t>
             </a:r>
           </a:p>
           <a:p>
             <a:pPr lvl="2"/>
             <a:r>
-              <a:rPr lang="en-US" smtClean="0"/>
+              <a:rPr lang="en-US"/>
               <a:t>Third level</a:t>
             </a:r>
           </a:p>
           <a:p>
             <a:pPr lvl="3"/>
             <a:r>
-              <a:rPr lang="en-US" smtClean="0"/>
+              <a:rPr lang="en-US"/>
               <a:t>Fourth level</a:t>
             </a:r>
           </a:p>
           <a:p>
             <a:pPr lvl="4"/>
             <a:r>
-              <a:rPr lang="en-US" smtClean="0"/>
+              <a:rPr lang="en-US"/>
               <a:t>Fifth level</a:t>
             </a:r>
             <a:endParaRPr lang="en-US" dirty="0"/>
@@ -4360,7 +4525,7 @@
           <a:p>
             <a:fld id="{CEF241BB-F2B7-4B67-A396-DB168B131349}" type="datetimeFigureOut">
               <a:rPr lang="en-US" smtClean="0"/>
-              <a:t>12/8/16</a:t>
+              <a:t>12/8/2016</a:t>
             </a:fld>
             <a:endParaRPr lang="en-US"/>
           </a:p>
@@ -4533,7 +4698,7 @@
           <a:lstStyle/>
           <a:p>
             <a:r>
-              <a:rPr lang="en-US" smtClean="0"/>
+              <a:rPr lang="en-US"/>
               <a:t>Click to edit Master title style</a:t>
             </a:r>
             <a:endParaRPr lang="en-US" dirty="0"/>
@@ -4562,35 +4727,35 @@
           <a:p>
             <a:pPr lvl="0"/>
             <a:r>
-              <a:rPr lang="en-US" smtClean="0"/>
+              <a:rPr lang="en-US"/>
               <a:t>Click to edit Master text styles</a:t>
             </a:r>
           </a:p>
           <a:p>
             <a:pPr lvl="1"/>
             <a:r>
-              <a:rPr lang="en-US" smtClean="0"/>
+              <a:rPr lang="en-US"/>
               <a:t>Second level</a:t>
             </a:r>
           </a:p>
           <a:p>
             <a:pPr lvl="2"/>
             <a:r>
-              <a:rPr lang="en-US" smtClean="0"/>
+              <a:rPr lang="en-US"/>
               <a:t>Third level</a:t>
             </a:r>
           </a:p>
           <a:p>
             <a:pPr lvl="3"/>
             <a:r>
-              <a:rPr lang="en-US" smtClean="0"/>
+              <a:rPr lang="en-US"/>
               <a:t>Fourth level</a:t>
             </a:r>
           </a:p>
           <a:p>
             <a:pPr lvl="4"/>
             <a:r>
-              <a:rPr lang="en-US" smtClean="0"/>
+              <a:rPr lang="en-US"/>
               <a:t>Fifth level</a:t>
             </a:r>
             <a:endParaRPr lang="en-US" dirty="0"/>
@@ -4619,7 +4784,7 @@
           <a:p>
             <a:fld id="{CEF241BB-F2B7-4B67-A396-DB168B131349}" type="datetimeFigureOut">
               <a:rPr lang="en-US" smtClean="0"/>
-              <a:t>12/8/16</a:t>
+              <a:t>12/8/2016</a:t>
             </a:fld>
             <a:endParaRPr lang="en-US"/>
           </a:p>
@@ -4745,7 +4910,7 @@
           <p:nvPr/>
         </p:nvPicPr>
         <p:blipFill>
-          <a:blip r:embed="rId3">
+          <a:blip r:embed="rId3" cstate="print">
             <a:extLst>
               <a:ext uri="{28A0092B-C50C-407E-A947-70E740481C1C}">
                 <a14:useLocalDpi xmlns:a14="http://schemas.microsoft.com/office/drawing/2010/main" val="0"/>
@@ -4861,7 +5026,7 @@
           <a:lstStyle/>
           <a:p>
             <a:r>
-              <a:rPr lang="en-US" smtClean="0"/>
+              <a:rPr lang="en-US"/>
               <a:t>Click to edit Master title style</a:t>
             </a:r>
             <a:endParaRPr lang="en-US" dirty="0"/>
@@ -4885,35 +5050,35 @@
           <a:p>
             <a:pPr lvl="0"/>
             <a:r>
-              <a:rPr lang="en-US" smtClean="0"/>
+              <a:rPr lang="en-US"/>
               <a:t>Click to edit Master text styles</a:t>
             </a:r>
           </a:p>
           <a:p>
             <a:pPr lvl="1"/>
             <a:r>
-              <a:rPr lang="en-US" smtClean="0"/>
+              <a:rPr lang="en-US"/>
               <a:t>Second level</a:t>
             </a:r>
           </a:p>
           <a:p>
             <a:pPr lvl="2"/>
             <a:r>
-              <a:rPr lang="en-US" smtClean="0"/>
+              <a:rPr lang="en-US"/>
               <a:t>Third level</a:t>
             </a:r>
           </a:p>
           <a:p>
             <a:pPr lvl="3"/>
             <a:r>
-              <a:rPr lang="en-US" smtClean="0"/>
+              <a:rPr lang="en-US"/>
               <a:t>Fourth level</a:t>
             </a:r>
           </a:p>
           <a:p>
             <a:pPr lvl="4"/>
             <a:r>
-              <a:rPr lang="en-US" smtClean="0"/>
+              <a:rPr lang="en-US"/>
               <a:t>Fifth level</a:t>
             </a:r>
             <a:endParaRPr lang="en-US" dirty="0"/>
@@ -4937,7 +5102,7 @@
           <a:p>
             <a:fld id="{CEF241BB-F2B7-4B67-A396-DB168B131349}" type="datetimeFigureOut">
               <a:rPr lang="en-US" smtClean="0"/>
-              <a:t>12/8/16</a:t>
+              <a:t>12/8/2016</a:t>
             </a:fld>
             <a:endParaRPr lang="en-US"/>
           </a:p>
@@ -5049,7 +5214,7 @@
           <p:nvPr/>
         </p:nvPicPr>
         <p:blipFill>
-          <a:blip r:embed="rId3">
+          <a:blip r:embed="rId3" cstate="print">
             <a:extLst>
               <a:ext uri="{28A0092B-C50C-407E-A947-70E740481C1C}">
                 <a14:useLocalDpi xmlns:a14="http://schemas.microsoft.com/office/drawing/2010/main" val="0"/>
@@ -5176,7 +5341,7 @@
           </a:lstStyle>
           <a:p>
             <a:r>
-              <a:rPr lang="en-US" smtClean="0"/>
+              <a:rPr lang="en-US"/>
               <a:t>Click to edit Master title style</a:t>
             </a:r>
             <a:endParaRPr lang="en-US" dirty="0"/>
@@ -5298,7 +5463,7 @@
           <a:p>
             <a:pPr lvl="0"/>
             <a:r>
-              <a:rPr lang="en-US" smtClean="0"/>
+              <a:rPr lang="en-US"/>
               <a:t>Click to edit Master text styles</a:t>
             </a:r>
           </a:p>
@@ -5321,7 +5486,7 @@
           <a:p>
             <a:fld id="{CEF241BB-F2B7-4B67-A396-DB168B131349}" type="datetimeFigureOut">
               <a:rPr lang="en-US" smtClean="0"/>
-              <a:t>12/8/16</a:t>
+              <a:t>12/8/2016</a:t>
             </a:fld>
             <a:endParaRPr lang="en-US"/>
           </a:p>
@@ -5438,7 +5603,7 @@
           <p:nvPr/>
         </p:nvPicPr>
         <p:blipFill>
-          <a:blip r:embed="rId3">
+          <a:blip r:embed="rId3" cstate="print">
             <a:extLst>
               <a:ext uri="{28A0092B-C50C-407E-A947-70E740481C1C}">
                 <a14:useLocalDpi xmlns:a14="http://schemas.microsoft.com/office/drawing/2010/main" val="0"/>
@@ -5554,7 +5719,7 @@
           <a:lstStyle/>
           <a:p>
             <a:r>
-              <a:rPr lang="en-US" smtClean="0"/>
+              <a:rPr lang="en-US"/>
               <a:t>Click to edit Master title style</a:t>
             </a:r>
             <a:endParaRPr lang="en-US" dirty="0"/>
@@ -5583,35 +5748,35 @@
           <a:p>
             <a:pPr lvl="0"/>
             <a:r>
-              <a:rPr lang="en-US" smtClean="0"/>
+              <a:rPr lang="en-US"/>
               <a:t>Click to edit Master text styles</a:t>
             </a:r>
           </a:p>
           <a:p>
             <a:pPr lvl="1"/>
             <a:r>
-              <a:rPr lang="en-US" smtClean="0"/>
+              <a:rPr lang="en-US"/>
               <a:t>Second level</a:t>
             </a:r>
           </a:p>
           <a:p>
             <a:pPr lvl="2"/>
             <a:r>
-              <a:rPr lang="en-US" smtClean="0"/>
+              <a:rPr lang="en-US"/>
               <a:t>Third level</a:t>
             </a:r>
           </a:p>
           <a:p>
             <a:pPr lvl="3"/>
             <a:r>
-              <a:rPr lang="en-US" smtClean="0"/>
+              <a:rPr lang="en-US"/>
               <a:t>Fourth level</a:t>
             </a:r>
           </a:p>
           <a:p>
             <a:pPr lvl="4"/>
             <a:r>
-              <a:rPr lang="en-US" smtClean="0"/>
+              <a:rPr lang="en-US"/>
               <a:t>Fifth level</a:t>
             </a:r>
             <a:endParaRPr lang="en-US" dirty="0"/>
@@ -5640,35 +5805,35 @@
           <a:p>
             <a:pPr lvl="0"/>
             <a:r>
-              <a:rPr lang="en-US" smtClean="0"/>
+              <a:rPr lang="en-US"/>
               <a:t>Click to edit Master text styles</a:t>
             </a:r>
           </a:p>
           <a:p>
             <a:pPr lvl="1"/>
             <a:r>
-              <a:rPr lang="en-US" smtClean="0"/>
+              <a:rPr lang="en-US"/>
               <a:t>Second level</a:t>
             </a:r>
           </a:p>
           <a:p>
             <a:pPr lvl="2"/>
             <a:r>
-              <a:rPr lang="en-US" smtClean="0"/>
+              <a:rPr lang="en-US"/>
               <a:t>Third level</a:t>
             </a:r>
           </a:p>
           <a:p>
             <a:pPr lvl="3"/>
             <a:r>
-              <a:rPr lang="en-US" smtClean="0"/>
+              <a:rPr lang="en-US"/>
               <a:t>Fourth level</a:t>
             </a:r>
           </a:p>
           <a:p>
             <a:pPr lvl="4"/>
             <a:r>
-              <a:rPr lang="en-US" smtClean="0"/>
+              <a:rPr lang="en-US"/>
               <a:t>Fifth level</a:t>
             </a:r>
             <a:endParaRPr lang="en-US" dirty="0"/>
@@ -5692,7 +5857,7 @@
           <a:p>
             <a:fld id="{CEF241BB-F2B7-4B67-A396-DB168B131349}" type="datetimeFigureOut">
               <a:rPr lang="en-US" smtClean="0"/>
-              <a:t>12/8/16</a:t>
+              <a:t>12/8/2016</a:t>
             </a:fld>
             <a:endParaRPr lang="en-US"/>
           </a:p>
@@ -5809,7 +5974,7 @@
           <p:nvPr/>
         </p:nvPicPr>
         <p:blipFill>
-          <a:blip r:embed="rId3">
+          <a:blip r:embed="rId3" cstate="print">
             <a:extLst>
               <a:ext uri="{28A0092B-C50C-407E-A947-70E740481C1C}">
                 <a14:useLocalDpi xmlns:a14="http://schemas.microsoft.com/office/drawing/2010/main" val="0"/>
@@ -5930,7 +6095,7 @@
           <a:lstStyle/>
           <a:p>
             <a:r>
-              <a:rPr lang="en-US" smtClean="0"/>
+              <a:rPr lang="en-US"/>
               <a:t>Click to edit Master title style</a:t>
             </a:r>
             <a:endParaRPr lang="en-US" dirty="0"/>
@@ -5996,7 +6161,7 @@
           <a:p>
             <a:pPr lvl="0"/>
             <a:r>
-              <a:rPr lang="en-US" smtClean="0"/>
+              <a:rPr lang="en-US"/>
               <a:t>Click to edit Master text styles</a:t>
             </a:r>
           </a:p>
@@ -6024,35 +6189,35 @@
           <a:p>
             <a:pPr lvl="0"/>
             <a:r>
-              <a:rPr lang="en-US" smtClean="0"/>
+              <a:rPr lang="en-US"/>
               <a:t>Click to edit Master text styles</a:t>
             </a:r>
           </a:p>
           <a:p>
             <a:pPr lvl="1"/>
             <a:r>
-              <a:rPr lang="en-US" smtClean="0"/>
+              <a:rPr lang="en-US"/>
               <a:t>Second level</a:t>
             </a:r>
           </a:p>
           <a:p>
             <a:pPr lvl="2"/>
             <a:r>
-              <a:rPr lang="en-US" smtClean="0"/>
+              <a:rPr lang="en-US"/>
               <a:t>Third level</a:t>
             </a:r>
           </a:p>
           <a:p>
             <a:pPr lvl="3"/>
             <a:r>
-              <a:rPr lang="en-US" smtClean="0"/>
+              <a:rPr lang="en-US"/>
               <a:t>Fourth level</a:t>
             </a:r>
           </a:p>
           <a:p>
             <a:pPr lvl="4"/>
             <a:r>
-              <a:rPr lang="en-US" smtClean="0"/>
+              <a:rPr lang="en-US"/>
               <a:t>Fifth level</a:t>
             </a:r>
             <a:endParaRPr lang="en-US" dirty="0"/>
@@ -6118,7 +6283,7 @@
           <a:p>
             <a:pPr lvl="0"/>
             <a:r>
-              <a:rPr lang="en-US" smtClean="0"/>
+              <a:rPr lang="en-US"/>
               <a:t>Click to edit Master text styles</a:t>
             </a:r>
           </a:p>
@@ -6146,35 +6311,35 @@
           <a:p>
             <a:pPr lvl="0"/>
             <a:r>
-              <a:rPr lang="en-US" smtClean="0"/>
+              <a:rPr lang="en-US"/>
               <a:t>Click to edit Master text styles</a:t>
             </a:r>
           </a:p>
           <a:p>
             <a:pPr lvl="1"/>
             <a:r>
-              <a:rPr lang="en-US" smtClean="0"/>
+              <a:rPr lang="en-US"/>
               <a:t>Second level</a:t>
             </a:r>
           </a:p>
           <a:p>
             <a:pPr lvl="2"/>
             <a:r>
-              <a:rPr lang="en-US" smtClean="0"/>
+              <a:rPr lang="en-US"/>
               <a:t>Third level</a:t>
             </a:r>
           </a:p>
           <a:p>
             <a:pPr lvl="3"/>
             <a:r>
-              <a:rPr lang="en-US" smtClean="0"/>
+              <a:rPr lang="en-US"/>
               <a:t>Fourth level</a:t>
             </a:r>
           </a:p>
           <a:p>
             <a:pPr lvl="4"/>
             <a:r>
-              <a:rPr lang="en-US" smtClean="0"/>
+              <a:rPr lang="en-US"/>
               <a:t>Fifth level</a:t>
             </a:r>
             <a:endParaRPr lang="en-US" dirty="0"/>
@@ -6198,7 +6363,7 @@
           <a:p>
             <a:fld id="{CEF241BB-F2B7-4B67-A396-DB168B131349}" type="datetimeFigureOut">
               <a:rPr lang="en-US" smtClean="0"/>
-              <a:t>12/8/16</a:t>
+              <a:t>12/8/2016</a:t>
             </a:fld>
             <a:endParaRPr lang="en-US"/>
           </a:p>
@@ -6315,7 +6480,7 @@
           <p:nvPr/>
         </p:nvPicPr>
         <p:blipFill>
-          <a:blip r:embed="rId3">
+          <a:blip r:embed="rId3" cstate="print">
             <a:extLst>
               <a:ext uri="{28A0092B-C50C-407E-A947-70E740481C1C}">
                 <a14:useLocalDpi xmlns:a14="http://schemas.microsoft.com/office/drawing/2010/main" val="0"/>
@@ -6431,7 +6596,7 @@
           <a:lstStyle/>
           <a:p>
             <a:r>
-              <a:rPr lang="en-US" smtClean="0"/>
+              <a:rPr lang="en-US"/>
               <a:t>Click to edit Master title style</a:t>
             </a:r>
             <a:endParaRPr lang="en-US" dirty="0"/>
@@ -6455,7 +6620,7 @@
           <a:p>
             <a:fld id="{CEF241BB-F2B7-4B67-A396-DB168B131349}" type="datetimeFigureOut">
               <a:rPr lang="en-US" smtClean="0"/>
-              <a:t>12/8/16</a:t>
+              <a:t>12/8/2016</a:t>
             </a:fld>
             <a:endParaRPr lang="en-US"/>
           </a:p>
@@ -6537,7 +6702,7 @@
           <p:nvPr/>
         </p:nvPicPr>
         <p:blipFill>
-          <a:blip r:embed="rId2">
+          <a:blip r:embed="rId2" cstate="print">
             <a:extLst>
               <a:ext uri="{28A0092B-C50C-407E-A947-70E740481C1C}">
                 <a14:useLocalDpi xmlns:a14="http://schemas.microsoft.com/office/drawing/2010/main" val="0"/>
@@ -6613,7 +6778,7 @@
           <a:p>
             <a:fld id="{CEF241BB-F2B7-4B67-A396-DB168B131349}" type="datetimeFigureOut">
               <a:rPr lang="en-US" smtClean="0"/>
-              <a:t>12/8/16</a:t>
+              <a:t>12/8/2016</a:t>
             </a:fld>
             <a:endParaRPr lang="en-US"/>
           </a:p>
@@ -6730,7 +6895,7 @@
           <p:nvPr/>
         </p:nvPicPr>
         <p:blipFill>
-          <a:blip r:embed="rId3">
+          <a:blip r:embed="rId3" cstate="print">
             <a:extLst>
               <a:ext uri="{28A0092B-C50C-407E-A947-70E740481C1C}">
                 <a14:useLocalDpi xmlns:a14="http://schemas.microsoft.com/office/drawing/2010/main" val="0"/>
@@ -6857,7 +7022,7 @@
           </a:lstStyle>
           <a:p>
             <a:r>
-              <a:rPr lang="en-US" smtClean="0"/>
+              <a:rPr lang="en-US"/>
               <a:t>Click to edit Master title style</a:t>
             </a:r>
             <a:endParaRPr lang="en-US" dirty="0"/>
@@ -6886,35 +7051,35 @@
           <a:p>
             <a:pPr lvl="0"/>
             <a:r>
-              <a:rPr lang="en-US" smtClean="0"/>
+              <a:rPr lang="en-US"/>
               <a:t>Click to edit Master text styles</a:t>
             </a:r>
           </a:p>
           <a:p>
             <a:pPr lvl="1"/>
             <a:r>
-              <a:rPr lang="en-US" smtClean="0"/>
+              <a:rPr lang="en-US"/>
               <a:t>Second level</a:t>
             </a:r>
           </a:p>
           <a:p>
             <a:pPr lvl="2"/>
             <a:r>
-              <a:rPr lang="en-US" smtClean="0"/>
+              <a:rPr lang="en-US"/>
               <a:t>Third level</a:t>
             </a:r>
           </a:p>
           <a:p>
             <a:pPr lvl="3"/>
             <a:r>
-              <a:rPr lang="en-US" smtClean="0"/>
+              <a:rPr lang="en-US"/>
               <a:t>Fourth level</a:t>
             </a:r>
           </a:p>
           <a:p>
             <a:pPr lvl="4"/>
             <a:r>
-              <a:rPr lang="en-US" smtClean="0"/>
+              <a:rPr lang="en-US"/>
               <a:t>Fifth level</a:t>
             </a:r>
             <a:endParaRPr lang="en-US" dirty="0"/>
@@ -6980,7 +7145,7 @@
           <a:p>
             <a:pPr lvl="0"/>
             <a:r>
-              <a:rPr lang="en-US" smtClean="0"/>
+              <a:rPr lang="en-US"/>
               <a:t>Click to edit Master text styles</a:t>
             </a:r>
           </a:p>
@@ -7003,7 +7168,7 @@
           <a:p>
             <a:fld id="{CEF241BB-F2B7-4B67-A396-DB168B131349}" type="datetimeFigureOut">
               <a:rPr lang="en-US" smtClean="0"/>
-              <a:t>12/8/16</a:t>
+              <a:t>12/8/2016</a:t>
             </a:fld>
             <a:endParaRPr lang="en-US"/>
           </a:p>
@@ -7120,7 +7285,7 @@
           <p:nvPr/>
         </p:nvPicPr>
         <p:blipFill>
-          <a:blip r:embed="rId3">
+          <a:blip r:embed="rId3" cstate="print">
             <a:extLst>
               <a:ext uri="{28A0092B-C50C-407E-A947-70E740481C1C}">
                 <a14:useLocalDpi xmlns:a14="http://schemas.microsoft.com/office/drawing/2010/main" val="0"/>
@@ -7247,7 +7412,7 @@
           </a:lstStyle>
           <a:p>
             <a:r>
-              <a:rPr lang="en-US" smtClean="0"/>
+              <a:rPr lang="en-US"/>
               <a:t>Click to edit Master title style</a:t>
             </a:r>
             <a:endParaRPr lang="en-US" dirty="0"/>
@@ -7323,7 +7488,7 @@
           </a:lstStyle>
           <a:p>
             <a:r>
-              <a:rPr lang="en-US" smtClean="0"/>
+              <a:rPr lang="en-US"/>
               <a:t>Drag picture to placeholder or click icon to add</a:t>
             </a:r>
             <a:endParaRPr lang="en-US" dirty="0"/>
@@ -7389,7 +7554,7 @@
           <a:p>
             <a:pPr lvl="0"/>
             <a:r>
-              <a:rPr lang="en-US" smtClean="0"/>
+              <a:rPr lang="en-US"/>
               <a:t>Click to edit Master text styles</a:t>
             </a:r>
           </a:p>
@@ -7412,7 +7577,7 @@
           <a:p>
             <a:fld id="{CEF241BB-F2B7-4B67-A396-DB168B131349}" type="datetimeFigureOut">
               <a:rPr lang="en-US" smtClean="0"/>
-              <a:t>12/8/16</a:t>
+              <a:t>12/8/2016</a:t>
             </a:fld>
             <a:endParaRPr lang="en-US"/>
           </a:p>
@@ -7547,7 +7712,7 @@
           <a:lstStyle/>
           <a:p>
             <a:r>
-              <a:rPr lang="en-US" smtClean="0"/>
+              <a:rPr lang="en-US"/>
               <a:t>Click to edit Master title style</a:t>
             </a:r>
             <a:endParaRPr lang="en-US" dirty="0"/>
@@ -7581,35 +7746,35 @@
           <a:p>
             <a:pPr lvl="0"/>
             <a:r>
-              <a:rPr lang="en-US" smtClean="0"/>
+              <a:rPr lang="en-US"/>
               <a:t>Click to edit Master text styles</a:t>
             </a:r>
           </a:p>
           <a:p>
             <a:pPr lvl="1"/>
             <a:r>
-              <a:rPr lang="en-US" smtClean="0"/>
+              <a:rPr lang="en-US"/>
               <a:t>Second level</a:t>
             </a:r>
           </a:p>
           <a:p>
             <a:pPr lvl="2"/>
             <a:r>
-              <a:rPr lang="en-US" smtClean="0"/>
+              <a:rPr lang="en-US"/>
               <a:t>Third level</a:t>
             </a:r>
           </a:p>
           <a:p>
             <a:pPr lvl="3"/>
             <a:r>
-              <a:rPr lang="en-US" smtClean="0"/>
+              <a:rPr lang="en-US"/>
               <a:t>Fourth level</a:t>
             </a:r>
           </a:p>
           <a:p>
             <a:pPr lvl="4"/>
             <a:r>
-              <a:rPr lang="en-US" smtClean="0"/>
+              <a:rPr lang="en-US"/>
               <a:t>Fifth level</a:t>
             </a:r>
             <a:endParaRPr lang="en-US" dirty="0"/>
@@ -7651,7 +7816,7 @@
           <a:p>
             <a:fld id="{CEF241BB-F2B7-4B67-A396-DB168B131349}" type="datetimeFigureOut">
               <a:rPr lang="en-US" smtClean="0"/>
-              <a:t>12/8/16</a:t>
+              <a:t>12/8/2016</a:t>
             </a:fld>
             <a:endParaRPr lang="en-US"/>
           </a:p>
@@ -8083,10 +8248,9 @@
           <a:lstStyle/>
           <a:p>
             <a:r>
-              <a:rPr lang="en-US" dirty="0" smtClean="0"/>
+              <a:rPr lang="en-US" dirty="0"/>
               <a:t>Useless Lockbox	</a:t>
             </a:r>
-            <a:endParaRPr lang="en-US" dirty="0"/>
           </a:p>
         </p:txBody>
       </p:sp>
@@ -8114,33 +8278,33 @@
           <a:p>
             <a:pPr algn="l"/>
             <a:r>
-              <a:rPr lang="en-US" sz="2400" dirty="0" smtClean="0"/>
+              <a:rPr lang="en-US" sz="2400" dirty="0"/>
               <a:t>Daniel Diaz </a:t>
             </a:r>
           </a:p>
           <a:p>
             <a:pPr algn="l"/>
             <a:r>
-              <a:rPr lang="en-US" sz="2400" dirty="0" smtClean="0"/>
+              <a:rPr lang="en-US" sz="2400" dirty="0"/>
               <a:t>Dwayne </a:t>
             </a:r>
             <a:r>
-              <a:rPr lang="en-US" sz="2400" dirty="0" err="1" smtClean="0"/>
+              <a:rPr lang="en-US" sz="2400" dirty="0" err="1"/>
               <a:t>Hoeck</a:t>
             </a:r>
-            <a:endParaRPr lang="en-US" sz="2400" dirty="0" smtClean="0"/>
+            <a:endParaRPr lang="en-US" sz="2400" dirty="0"/>
           </a:p>
           <a:p>
             <a:pPr algn="l"/>
             <a:r>
-              <a:rPr lang="en-US" sz="2400" dirty="0" smtClean="0"/>
+              <a:rPr lang="en-US" sz="2400" dirty="0"/>
               <a:t>Ha Tran</a:t>
             </a:r>
           </a:p>
           <a:p>
             <a:pPr algn="l"/>
             <a:r>
-              <a:rPr lang="en-US" sz="2400" dirty="0" smtClean="0"/>
+              <a:rPr lang="en-US" sz="2400" dirty="0"/>
               <a:t>Thanh Le</a:t>
             </a:r>
           </a:p>
@@ -8188,7 +8352,7 @@
           </a:lstStyle>
           <a:p>
             <a:r>
-              <a:rPr lang="en-US" smtClean="0"/>
+              <a:rPr lang="en-US"/>
               <a:t>Team 09</a:t>
             </a:r>
             <a:endParaRPr lang="en-US" dirty="0"/>
@@ -8241,10 +8405,9 @@
           <a:lstStyle/>
           <a:p>
             <a:r>
-              <a:rPr lang="en-US" dirty="0" smtClean="0"/>
+              <a:rPr lang="en-US" dirty="0"/>
               <a:t>Design Process– Block Diagram</a:t>
             </a:r>
-            <a:endParaRPr lang="en-US" dirty="0"/>
           </a:p>
         </p:txBody>
       </p:sp>
@@ -8288,13 +8451,6 @@
   <p:clrMapOvr>
     <a:masterClrMapping/>
   </p:clrMapOvr>
-  <p:timing>
-    <p:tnLst>
-      <p:par>
-        <p:cTn id="1" dur="indefinite" restart="never" nodeType="tmRoot"/>
-      </p:par>
-    </p:tnLst>
-  </p:timing>
 </p:sld>
 </file>
 
@@ -8331,10 +8487,9 @@
           <a:lstStyle/>
           <a:p>
             <a:r>
-              <a:rPr lang="en-US" dirty="0" smtClean="0"/>
+              <a:rPr lang="en-US" dirty="0"/>
               <a:t>Design Alternatives and Decision Making</a:t>
             </a:r>
-            <a:endParaRPr lang="en-US" dirty="0"/>
           </a:p>
         </p:txBody>
       </p:sp>
@@ -8364,28 +8519,28 @@
           <a:lstStyle/>
           <a:p>
             <a:r>
-              <a:rPr lang="en-US" sz="2800" dirty="0" smtClean="0"/>
+              <a:rPr lang="en-US" sz="2800" dirty="0"/>
               <a:t>Design alternative</a:t>
             </a:r>
           </a:p>
           <a:p>
             <a:pPr lvl="1" algn="just"/>
             <a:r>
-              <a:rPr lang="en-US" sz="2400" dirty="0" smtClean="0"/>
+              <a:rPr lang="en-US" sz="2400" dirty="0"/>
               <a:t>Visual studio vs Arduino IDE</a:t>
             </a:r>
           </a:p>
           <a:p>
             <a:pPr lvl="1" algn="just"/>
             <a:r>
-              <a:rPr lang="en-US" sz="2400" dirty="0" smtClean="0"/>
+              <a:rPr lang="en-US" sz="2400" dirty="0"/>
               <a:t>4-bit vs 8-bit interaction for LCD</a:t>
             </a:r>
           </a:p>
           <a:p>
             <a:pPr lvl="1" algn="just"/>
             <a:r>
-              <a:rPr lang="en-US" sz="2400" dirty="0" smtClean="0"/>
+              <a:rPr lang="en-US" sz="2400" dirty="0"/>
               <a:t>Interrupt vs pull-up GPIO for keypad</a:t>
             </a:r>
           </a:p>
@@ -8393,18 +8548,13 @@
             <a:pPr lvl="1" algn="just"/>
             <a:r>
               <a:rPr lang="en-US" sz="2400" dirty="0"/>
-              <a:t>SOLIDWORKS vs Adobe </a:t>
-            </a:r>
-            <a:r>
-              <a:rPr lang="en-US" sz="2400" dirty="0" smtClean="0"/>
-              <a:t>Reader for box design</a:t>
-            </a:r>
-            <a:endParaRPr lang="en-US" sz="2400" dirty="0"/>
+              <a:t>SOLIDWORKS vs Adobe Reader for box design</a:t>
+            </a:r>
           </a:p>
           <a:p>
             <a:pPr lvl="1" algn="just"/>
             <a:r>
-              <a:rPr lang="en-US" sz="2400" dirty="0" smtClean="0"/>
+              <a:rPr lang="en-US" sz="2400" dirty="0"/>
               <a:t>3D-printing vs Laser-cutter for box prototype</a:t>
             </a:r>
           </a:p>
@@ -8440,85 +8590,84 @@
           <a:lstStyle/>
           <a:p>
             <a:r>
-              <a:rPr lang="en-US" sz="2800" dirty="0" smtClean="0"/>
+              <a:rPr lang="en-US" sz="2800" dirty="0"/>
               <a:t>Decisions made</a:t>
             </a:r>
           </a:p>
           <a:p>
             <a:pPr lvl="1"/>
             <a:r>
-              <a:rPr lang="en-US" sz="2400" dirty="0" smtClean="0"/>
+              <a:rPr lang="en-US" sz="2400" dirty="0"/>
               <a:t>Visual studio:</a:t>
             </a:r>
           </a:p>
           <a:p>
             <a:pPr lvl="2"/>
             <a:r>
-              <a:rPr lang="en-US" sz="2200" dirty="0" smtClean="0"/>
+              <a:rPr lang="en-US" sz="2200" dirty="0"/>
               <a:t>Available in lab</a:t>
             </a:r>
           </a:p>
           <a:p>
             <a:pPr lvl="2"/>
             <a:r>
-              <a:rPr lang="en-US" sz="2200" dirty="0" smtClean="0"/>
+              <a:rPr lang="en-US" sz="2200" dirty="0"/>
               <a:t>Debugging ability</a:t>
             </a:r>
           </a:p>
           <a:p>
             <a:pPr lvl="1"/>
             <a:r>
-              <a:rPr lang="en-US" sz="2400" dirty="0" smtClean="0"/>
+              <a:rPr lang="en-US" sz="2400" dirty="0"/>
               <a:t>4-bit interaction for LCD:</a:t>
             </a:r>
           </a:p>
           <a:p>
             <a:pPr lvl="2"/>
             <a:r>
-              <a:rPr lang="en-US" sz="2200" dirty="0" smtClean="0"/>
+              <a:rPr lang="en-US" sz="2200" dirty="0"/>
               <a:t>I/O pins saving</a:t>
             </a:r>
           </a:p>
           <a:p>
             <a:pPr lvl="1"/>
             <a:r>
-              <a:rPr lang="en-US" sz="2400" dirty="0" smtClean="0"/>
+              <a:rPr lang="en-US" sz="2400" dirty="0"/>
               <a:t>Interrupt GPIO for Keypad:</a:t>
             </a:r>
           </a:p>
           <a:p>
             <a:pPr lvl="2"/>
             <a:r>
-              <a:rPr lang="en-US" sz="2200" dirty="0" smtClean="0"/>
+              <a:rPr lang="en-US" sz="2200" dirty="0"/>
               <a:t>Common pin usage with ISP pins</a:t>
             </a:r>
           </a:p>
           <a:p>
             <a:pPr lvl="1"/>
             <a:r>
-              <a:rPr lang="en-US" sz="2400" dirty="0" smtClean="0"/>
+              <a:rPr lang="en-US" sz="2400" dirty="0"/>
               <a:t>SOLIDWORKS: More flexible</a:t>
             </a:r>
           </a:p>
           <a:p>
             <a:pPr lvl="1"/>
             <a:r>
-              <a:rPr lang="en-US" sz="2400" dirty="0" smtClean="0"/>
+              <a:rPr lang="en-US" sz="2400" dirty="0"/>
               <a:t>Laser-cutter: </a:t>
             </a:r>
           </a:p>
           <a:p>
             <a:pPr lvl="2"/>
             <a:r>
-              <a:rPr lang="en-US" sz="2200" dirty="0" smtClean="0"/>
+              <a:rPr lang="en-US" sz="2200" dirty="0"/>
               <a:t>Faster</a:t>
             </a:r>
-            <a:endParaRPr lang="en-US" sz="2200" dirty="0"/>
           </a:p>
           <a:p>
             <a:pPr lvl="2"/>
             <a:r>
-              <a:rPr lang="en-US" sz="2200" dirty="0" smtClean="0"/>
+              <a:rPr lang="en-US" sz="2200" dirty="0"/>
               <a:t>Easy to fix</a:t>
             </a:r>
             <a:endParaRPr lang="en-US" dirty="0"/>
@@ -8535,13 +8684,6 @@
   <p:clrMapOvr>
     <a:masterClrMapping/>
   </p:clrMapOvr>
-  <p:timing>
-    <p:tnLst>
-      <p:par>
-        <p:cTn id="1" dur="indefinite" restart="never" nodeType="tmRoot"/>
-      </p:par>
-    </p:tnLst>
-  </p:timing>
 </p:sld>
 </file>
 
@@ -8578,10 +8720,9 @@
           <a:lstStyle/>
           <a:p>
             <a:r>
-              <a:rPr lang="en-US" dirty="0" smtClean="0"/>
+              <a:rPr lang="en-US" dirty="0"/>
               <a:t>Implementation</a:t>
             </a:r>
-            <a:endParaRPr lang="en-US" dirty="0"/>
           </a:p>
         </p:txBody>
       </p:sp>
@@ -8618,7 +8759,7 @@
               <a:defRPr/>
             </a:pPr>
             <a:r>
-              <a:rPr lang="en-US" dirty="0" smtClean="0"/>
+              <a:rPr lang="en-US" dirty="0"/>
               <a:t>Major components:</a:t>
             </a:r>
           </a:p>
@@ -8641,7 +8782,7 @@
               <a:defRPr/>
             </a:pPr>
             <a:r>
-              <a:rPr lang="en-US" dirty="0" smtClean="0"/>
+              <a:rPr lang="en-US" dirty="0"/>
               <a:t>Microprocessor: ATmega328P</a:t>
             </a:r>
           </a:p>
@@ -8664,7 +8805,7 @@
               <a:defRPr/>
             </a:pPr>
             <a:r>
-              <a:rPr lang="en-US" dirty="0" smtClean="0"/>
+              <a:rPr lang="en-US" dirty="0"/>
               <a:t>Locking Mechanism:</a:t>
             </a:r>
           </a:p>
@@ -8680,7 +8821,7 @@
               <a:buChar char="•"/>
             </a:pPr>
             <a:r>
-              <a:rPr lang="en-US" dirty="0" smtClean="0"/>
+              <a:rPr lang="en-US" dirty="0"/>
               <a:t>Key Pad</a:t>
             </a:r>
           </a:p>
@@ -8696,7 +8837,7 @@
               <a:buChar char="•"/>
             </a:pPr>
             <a:r>
-              <a:rPr lang="en-US" dirty="0" smtClean="0"/>
+              <a:rPr lang="en-US" dirty="0"/>
               <a:t>16x2 LCD Display</a:t>
             </a:r>
           </a:p>
@@ -8712,7 +8853,7 @@
               <a:buChar char="•"/>
             </a:pPr>
             <a:r>
-              <a:rPr lang="en-US" dirty="0" smtClean="0"/>
+              <a:rPr lang="en-US" dirty="0"/>
               <a:t>Solenoid</a:t>
             </a:r>
           </a:p>
@@ -8726,7 +8867,7 @@
               </a:spcBef>
             </a:pPr>
             <a:r>
-              <a:rPr lang="en-US" dirty="0" smtClean="0"/>
+              <a:rPr lang="en-US" dirty="0"/>
               <a:t>Useless Box Mechanism:</a:t>
             </a:r>
           </a:p>
@@ -8740,7 +8881,7 @@
               </a:spcBef>
             </a:pPr>
             <a:r>
-              <a:rPr lang="en-US" dirty="0" smtClean="0"/>
+              <a:rPr lang="en-US" dirty="0"/>
               <a:t>Switch</a:t>
             </a:r>
           </a:p>
@@ -8754,10 +8895,9 @@
               </a:spcBef>
             </a:pPr>
             <a:r>
-              <a:rPr lang="en-US" dirty="0" smtClean="0"/>
+              <a:rPr lang="en-US" dirty="0"/>
               <a:t>Servo</a:t>
             </a:r>
-            <a:endParaRPr lang="en-US" dirty="0"/>
           </a:p>
         </p:txBody>
       </p:sp>
@@ -8777,10 +8917,9 @@
           <a:lstStyle/>
           <a:p>
             <a:r>
-              <a:rPr lang="en-US" dirty="0" smtClean="0"/>
+              <a:rPr lang="en-US" dirty="0"/>
               <a:t>Picture for main component go hear</a:t>
             </a:r>
-            <a:endParaRPr lang="en-US" dirty="0"/>
           </a:p>
         </p:txBody>
       </p:sp>
@@ -8794,13 +8933,6 @@
   <p:clrMapOvr>
     <a:masterClrMapping/>
   </p:clrMapOvr>
-  <p:timing>
-    <p:tnLst>
-      <p:par>
-        <p:cTn id="1" dur="indefinite" restart="never" nodeType="tmRoot"/>
-      </p:par>
-    </p:tnLst>
-  </p:timing>
 </p:sld>
 </file>
 
@@ -8844,10 +8976,9 @@
           <a:lstStyle/>
           <a:p>
             <a:r>
-              <a:rPr lang="en-US" dirty="0" smtClean="0"/>
+              <a:rPr lang="en-US" dirty="0"/>
               <a:t>Implementation - Schematic</a:t>
             </a:r>
-            <a:endParaRPr lang="en-US" dirty="0"/>
           </a:p>
         </p:txBody>
       </p:sp>
@@ -8890,13 +9021,6 @@
   <p:clrMapOvr>
     <a:masterClrMapping/>
   </p:clrMapOvr>
-  <p:timing>
-    <p:tnLst>
-      <p:par>
-        <p:cTn id="1" dur="indefinite" restart="never" nodeType="tmRoot"/>
-      </p:par>
-    </p:tnLst>
-  </p:timing>
 </p:sld>
 </file>
 
@@ -8933,17 +9057,16 @@
           <a:lstStyle/>
           <a:p>
             <a:r>
-              <a:rPr lang="en-US" dirty="0" smtClean="0"/>
+              <a:rPr lang="en-US" dirty="0"/>
               <a:t>Implementation</a:t>
             </a:r>
             <a:br>
-              <a:rPr lang="en-US" dirty="0" smtClean="0"/>
+              <a:rPr lang="en-US" dirty="0"/>
             </a:br>
             <a:r>
-              <a:rPr lang="en-US" dirty="0" smtClean="0"/>
+              <a:rPr lang="en-US" dirty="0"/>
               <a:t>Coding</a:t>
             </a:r>
-            <a:endParaRPr lang="en-US" dirty="0"/>
           </a:p>
         </p:txBody>
       </p:sp>
@@ -9022,17 +9145,16 @@
           <a:lstStyle/>
           <a:p>
             <a:r>
-              <a:rPr lang="en-US" dirty="0" smtClean="0"/>
+              <a:rPr lang="en-US" dirty="0"/>
               <a:t>Implementation</a:t>
             </a:r>
             <a:br>
-              <a:rPr lang="en-US" dirty="0" smtClean="0"/>
+              <a:rPr lang="en-US" dirty="0"/>
             </a:br>
             <a:r>
-              <a:rPr lang="en-US" dirty="0" smtClean="0"/>
+              <a:rPr lang="en-US" dirty="0"/>
               <a:t>Pseudo code</a:t>
             </a:r>
-            <a:endParaRPr lang="en-US" dirty="0"/>
           </a:p>
         </p:txBody>
       </p:sp>
@@ -9069,7 +9191,7 @@
               <a:defRPr/>
             </a:pPr>
             <a:r>
-              <a:rPr lang="en-US" dirty="0" smtClean="0"/>
+              <a:rPr lang="en-US" dirty="0"/>
               <a:t>While switch on</a:t>
             </a:r>
           </a:p>
@@ -9093,11 +9215,7 @@
             </a:pPr>
             <a:r>
               <a:rPr lang="en-US" dirty="0"/>
-              <a:t>	</a:t>
-            </a:r>
-            <a:r>
-              <a:rPr lang="en-US" dirty="0" smtClean="0"/>
-              <a:t>Ask for 4-key number code</a:t>
+              <a:t>	Ask for 4-key number code</a:t>
             </a:r>
           </a:p>
           <a:p>
@@ -9120,11 +9238,7 @@
             </a:pPr>
             <a:r>
               <a:rPr lang="en-US" dirty="0"/>
-              <a:t>	</a:t>
-            </a:r>
-            <a:r>
-              <a:rPr lang="en-US" dirty="0" smtClean="0"/>
-              <a:t>If the code is the pass code: open the box, flip the switch</a:t>
+              <a:t>	If the code is the pass code: open the box, flip the switch</a:t>
             </a:r>
           </a:p>
           <a:p>
@@ -9147,11 +9261,7 @@
             </a:pPr>
             <a:r>
               <a:rPr lang="en-US" dirty="0"/>
-              <a:t>	</a:t>
-            </a:r>
-            <a:r>
-              <a:rPr lang="en-US" dirty="0" smtClean="0"/>
-              <a:t>Else If the code is the reset code: run the reset sequence</a:t>
+              <a:t>	Else If the code is the reset code: run the reset sequence</a:t>
             </a:r>
           </a:p>
           <a:p>
@@ -9173,7 +9283,7 @@
               <a:defRPr/>
             </a:pPr>
             <a:r>
-              <a:rPr lang="en-US" dirty="0" smtClean="0"/>
+              <a:rPr lang="en-US" dirty="0"/>
               <a:t>	Else if the code is admin code: run the change sequence</a:t>
             </a:r>
           </a:p>
@@ -9197,11 +9307,7 @@
             </a:pPr>
             <a:r>
               <a:rPr lang="en-US" dirty="0"/>
-              <a:t>	</a:t>
-            </a:r>
-            <a:r>
-              <a:rPr lang="en-US" dirty="0" smtClean="0"/>
-              <a:t>Else flip the switch</a:t>
+              <a:t>	Else flip the switch</a:t>
             </a:r>
           </a:p>
           <a:p>
@@ -9226,7 +9332,6 @@
               <a:rPr lang="en-US" dirty="0"/>
               <a:t>	</a:t>
             </a:r>
-            <a:endParaRPr lang="en-US" dirty="0" smtClean="0"/>
           </a:p>
         </p:txBody>
       </p:sp>
@@ -9281,7 +9386,7 @@
           <a:lstStyle/>
           <a:p>
             <a:r>
-              <a:rPr lang="en-US" smtClean="0"/>
+              <a:rPr lang="en-US"/>
               <a:t>Implementation - Board Layout and Box Model</a:t>
             </a:r>
             <a:endParaRPr lang="en-US" dirty="0"/>
@@ -9299,7 +9404,7 @@
           </p:nvPr>
         </p:nvPicPr>
         <p:blipFill>
-          <a:blip r:embed="rId2">
+          <a:blip r:embed="rId2" cstate="print">
             <a:extLst>
               <a:ext uri="{28A0092B-C50C-407E-A947-70E740481C1C}">
                 <a14:useLocalDpi xmlns:a14="http://schemas.microsoft.com/office/drawing/2010/main" val="0"/>
@@ -9393,21 +9498,16 @@
           <a:lstStyle/>
           <a:p>
             <a:r>
-              <a:rPr lang="en-US" dirty="0" smtClean="0"/>
+              <a:rPr lang="en-US" dirty="0"/>
               <a:t>Implementation </a:t>
-            </a:r>
-            <a:r>
-              <a:rPr lang="en-US" dirty="0"/>
-              <a:t/>
             </a:r>
             <a:br>
               <a:rPr lang="en-US" dirty="0"/>
             </a:br>
             <a:r>
-              <a:rPr lang="en-US" dirty="0" smtClean="0"/>
+              <a:rPr lang="en-US" dirty="0"/>
               <a:t>Billing of Materials</a:t>
             </a:r>
-            <a:endParaRPr lang="en-US" dirty="0"/>
           </a:p>
         </p:txBody>
       </p:sp>
@@ -9450,13 +9550,6 @@
   <p:clrMapOvr>
     <a:masterClrMapping/>
   </p:clrMapOvr>
-  <p:timing>
-    <p:tnLst>
-      <p:par>
-        <p:cTn id="1" dur="indefinite" restart="never" nodeType="tmRoot"/>
-      </p:par>
-    </p:tnLst>
-  </p:timing>
 </p:sld>
 </file>
 
@@ -9493,10 +9586,9 @@
           <a:lstStyle/>
           <a:p>
             <a:r>
-              <a:rPr lang="en-US" dirty="0" smtClean="0"/>
+              <a:rPr lang="en-US" dirty="0"/>
               <a:t>IP and Prior Work</a:t>
             </a:r>
-            <a:endParaRPr lang="en-US" dirty="0"/>
           </a:p>
         </p:txBody>
       </p:sp>
@@ -9516,21 +9608,21 @@
           <a:lstStyle/>
           <a:p>
             <a:r>
-              <a:rPr lang="en-US" dirty="0" smtClean="0"/>
+              <a:rPr lang="en-US" dirty="0"/>
               <a:t>Useless box: Originally designed in 1930s by Italian artist Bruno </a:t>
             </a:r>
             <a:r>
-              <a:rPr lang="en-US" dirty="0" err="1" smtClean="0"/>
+              <a:rPr lang="en-US" dirty="0" err="1"/>
               <a:t>Munari</a:t>
             </a:r>
             <a:r>
-              <a:rPr lang="en-US" dirty="0" smtClean="0"/>
+              <a:rPr lang="en-US" dirty="0"/>
               <a:t>. The most famous useless box began in 1952 at Bell Labs by Marvin Minsky.</a:t>
             </a:r>
           </a:p>
           <a:p>
             <a:r>
-              <a:rPr lang="en-US" dirty="0" smtClean="0"/>
+              <a:rPr lang="en-US" dirty="0"/>
               <a:t>Lock box: The first key lockbox was invented over 55 years ago by Delbert Williams.</a:t>
             </a:r>
           </a:p>
@@ -9582,10 +9674,9 @@
           <a:lstStyle/>
           <a:p>
             <a:r>
-              <a:rPr lang="en-US" dirty="0" smtClean="0"/>
+              <a:rPr lang="en-US" dirty="0"/>
               <a:t>Testing plan</a:t>
             </a:r>
-            <a:endParaRPr lang="en-US" dirty="0"/>
           </a:p>
         </p:txBody>
       </p:sp>
@@ -9606,65 +9697,65 @@
           </a:bodyPr>
           <a:lstStyle/>
           <a:p>
-            <a:endParaRPr lang="en-US" dirty="0" smtClean="0"/>
-          </a:p>
-          <a:p>
-            <a:r>
-              <a:rPr lang="en-US" dirty="0" smtClean="0"/>
+            <a:endParaRPr lang="en-US" dirty="0"/>
+          </a:p>
+          <a:p>
+            <a:r>
+              <a:rPr lang="en-US" dirty="0"/>
               <a:t>Individual modules testing: servo, keypad, LCD, switch</a:t>
             </a:r>
           </a:p>
           <a:p>
             <a:r>
-              <a:rPr lang="en-US" dirty="0" smtClean="0"/>
+              <a:rPr lang="en-US" dirty="0"/>
               <a:t>Integrations test: Correct code/ Admin code/ Incorrect code enter</a:t>
             </a:r>
           </a:p>
           <a:p>
             <a:r>
-              <a:rPr lang="en-US" dirty="0" smtClean="0"/>
+              <a:rPr lang="en-US" dirty="0"/>
               <a:t>Acceptance test: does it meet the condition is PDS</a:t>
             </a:r>
           </a:p>
           <a:p>
             <a:pPr lvl="1"/>
             <a:r>
-              <a:rPr lang="en-US" dirty="0" smtClean="0"/>
+              <a:rPr lang="en-US" dirty="0"/>
               <a:t>Privacy</a:t>
             </a:r>
           </a:p>
           <a:p>
             <a:pPr lvl="1"/>
             <a:r>
-              <a:rPr lang="en-US" dirty="0" smtClean="0"/>
+              <a:rPr lang="en-US" dirty="0"/>
               <a:t>Entertaining</a:t>
             </a:r>
           </a:p>
           <a:p>
             <a:pPr lvl="1"/>
             <a:r>
-              <a:rPr lang="en-US" dirty="0" smtClean="0"/>
+              <a:rPr lang="en-US" dirty="0"/>
               <a:t>Environmentally friendly</a:t>
             </a:r>
           </a:p>
           <a:p>
             <a:pPr lvl="1"/>
             <a:r>
-              <a:rPr lang="en-US" dirty="0" smtClean="0"/>
+              <a:rPr lang="en-US" dirty="0"/>
               <a:t>Authenticity</a:t>
             </a:r>
           </a:p>
           <a:p>
             <a:pPr lvl="1"/>
             <a:r>
-              <a:rPr lang="en-US" dirty="0" smtClean="0"/>
+              <a:rPr lang="en-US" dirty="0"/>
               <a:t>Economic</a:t>
             </a:r>
           </a:p>
           <a:p>
             <a:pPr lvl="1"/>
             <a:r>
-              <a:rPr lang="en-US" dirty="0" smtClean="0"/>
+              <a:rPr lang="en-US" dirty="0"/>
               <a:t>Operational physical environments</a:t>
             </a:r>
           </a:p>
@@ -9720,10 +9811,9 @@
           <a:lstStyle/>
           <a:p>
             <a:r>
-              <a:rPr lang="en-US" dirty="0" smtClean="0"/>
+              <a:rPr lang="en-US" dirty="0"/>
               <a:t>Need and Motivation</a:t>
             </a:r>
-            <a:endParaRPr lang="en-US" dirty="0"/>
           </a:p>
         </p:txBody>
       </p:sp>
@@ -9751,58 +9841,43 @@
           <a:p>
             <a:pPr algn="just"/>
             <a:r>
-              <a:rPr lang="en-US" dirty="0" smtClean="0"/>
+              <a:rPr lang="en-US" dirty="0"/>
               <a:t>Need:</a:t>
             </a:r>
           </a:p>
           <a:p>
             <a:pPr lvl="1" algn="just"/>
             <a:r>
-              <a:rPr lang="en-US" dirty="0" smtClean="0"/>
-              <a:t>Privacy </a:t>
-            </a:r>
-            <a:r>
               <a:rPr lang="en-US" dirty="0"/>
-              <a:t>and security have become major concerns in society today. Whether it be a teenager trying to keep a diary hidden or an adult keeping money away from a less than trustworthy roommate, a lockbox is a good way to go. </a:t>
-            </a:r>
-            <a:endParaRPr lang="en-US" dirty="0" smtClean="0"/>
+              <a:t>Privacy and security have become major concerns in society today. Whether it be a teenager trying to keep a diary hidden or an adult keeping money away from a less than trustworthy roommate, a lockbox is a good way to go. </a:t>
+            </a:r>
           </a:p>
           <a:p>
             <a:pPr lvl="1" algn="just"/>
             <a:r>
-              <a:rPr lang="en-US" dirty="0" smtClean="0"/>
-              <a:t>Unfortunately</a:t>
-            </a:r>
-            <a:r>
               <a:rPr lang="en-US" dirty="0"/>
-              <a:t>, lockboxes are obvious and sometimes bring with them curiosity as to what is inside. An interesting and elegant way to keep a lockbox without arousing much suspicion is needed</a:t>
-            </a:r>
-            <a:r>
-              <a:rPr lang="en-US" dirty="0" smtClean="0"/>
-              <a:t>.</a:t>
-            </a:r>
-          </a:p>
-          <a:p>
-            <a:r>
-              <a:rPr lang="en-US" dirty="0" smtClean="0"/>
+              <a:t>Unfortunately, lockboxes are obvious and sometimes bring with them curiosity as to what is inside. An interesting and elegant way to keep a lockbox without arousing much suspicion is needed.</a:t>
+            </a:r>
+          </a:p>
+          <a:p>
+            <a:r>
+              <a:rPr lang="en-US" dirty="0"/>
               <a:t>Motivation</a:t>
             </a:r>
           </a:p>
           <a:p>
             <a:pPr lvl="1"/>
             <a:r>
-              <a:rPr lang="en-US" dirty="0" smtClean="0"/>
+              <a:rPr lang="en-US" dirty="0"/>
               <a:t>Privacy</a:t>
             </a:r>
-            <a:endParaRPr lang="en-US" dirty="0"/>
           </a:p>
           <a:p>
             <a:pPr lvl="1"/>
             <a:r>
-              <a:rPr lang="en-US" dirty="0" smtClean="0"/>
+              <a:rPr lang="en-US" dirty="0"/>
               <a:t>Entertaining</a:t>
             </a:r>
-            <a:endParaRPr lang="en-US" dirty="0"/>
           </a:p>
           <a:p>
             <a:pPr lvl="1"/>
@@ -9821,12 +9896,8 @@
           <a:p>
             <a:pPr lvl="1"/>
             <a:r>
-              <a:rPr lang="en-US" dirty="0" smtClean="0"/>
-              <a:t>Aesthetically </a:t>
-            </a:r>
-            <a:r>
               <a:rPr lang="en-US" dirty="0"/>
-              <a:t>pleasing</a:t>
+              <a:t>Aesthetically pleasing</a:t>
             </a:r>
           </a:p>
           <a:p>
@@ -9836,7 +9907,7 @@
             <a:endParaRPr lang="en-US" dirty="0"/>
           </a:p>
           <a:p>
-            <a:endParaRPr lang="en-US" dirty="0" smtClean="0"/>
+            <a:endParaRPr lang="en-US" dirty="0"/>
           </a:p>
         </p:txBody>
       </p:sp>
@@ -9886,10 +9957,9 @@
           <a:lstStyle/>
           <a:p>
             <a:r>
-              <a:rPr lang="en-US" dirty="0" smtClean="0"/>
+              <a:rPr lang="en-US" dirty="0"/>
               <a:t>Result</a:t>
             </a:r>
-            <a:endParaRPr lang="en-US" dirty="0"/>
           </a:p>
         </p:txBody>
       </p:sp>
@@ -9909,16 +9979,15 @@
           <a:lstStyle/>
           <a:p>
             <a:r>
-              <a:rPr lang="en-US" dirty="0" smtClean="0"/>
+              <a:rPr lang="en-US" dirty="0"/>
               <a:t>A lock box and four working PCBs</a:t>
             </a:r>
           </a:p>
           <a:p>
             <a:r>
-              <a:rPr lang="en-US" dirty="0" smtClean="0"/>
+              <a:rPr lang="en-US" dirty="0"/>
               <a:t>Picture of the whole box here</a:t>
             </a:r>
-            <a:endParaRPr lang="en-US" dirty="0"/>
           </a:p>
         </p:txBody>
       </p:sp>
@@ -9968,10 +10037,9 @@
           <a:lstStyle/>
           <a:p>
             <a:r>
-              <a:rPr lang="en-US" dirty="0" smtClean="0"/>
+              <a:rPr lang="en-US" dirty="0"/>
               <a:t>Contribution and Lessons Learning</a:t>
             </a:r>
-            <a:endParaRPr lang="en-US" dirty="0"/>
           </a:p>
         </p:txBody>
       </p:sp>
@@ -10006,7 +10074,7 @@
               </a:spcBef>
             </a:pPr>
             <a:r>
-              <a:rPr lang="en-US" dirty="0" smtClean="0"/>
+              <a:rPr lang="en-US" dirty="0"/>
               <a:t>Contribution: All members are involved in the whole design process. </a:t>
             </a:r>
           </a:p>
@@ -10020,7 +10088,7 @@
               </a:spcBef>
             </a:pPr>
             <a:r>
-              <a:rPr lang="en-US" dirty="0" smtClean="0"/>
+              <a:rPr lang="en-US" dirty="0"/>
               <a:t>Box printing</a:t>
             </a:r>
           </a:p>
@@ -10034,7 +10102,7 @@
               </a:spcBef>
             </a:pPr>
             <a:r>
-              <a:rPr lang="en-US" dirty="0" smtClean="0"/>
+              <a:rPr lang="en-US" dirty="0"/>
               <a:t>Schematic/PCB</a:t>
             </a:r>
           </a:p>
@@ -10048,7 +10116,7 @@
               </a:spcBef>
             </a:pPr>
             <a:r>
-              <a:rPr lang="en-US" dirty="0" smtClean="0"/>
+              <a:rPr lang="en-US" dirty="0"/>
               <a:t>Coding</a:t>
             </a:r>
           </a:p>
@@ -10062,7 +10130,7 @@
               </a:spcBef>
             </a:pPr>
             <a:r>
-              <a:rPr lang="en-US" dirty="0" smtClean="0"/>
+              <a:rPr lang="en-US" dirty="0"/>
               <a:t>Testing</a:t>
             </a:r>
           </a:p>
@@ -10076,7 +10144,7 @@
               </a:spcBef>
             </a:pPr>
             <a:r>
-              <a:rPr lang="en-US" dirty="0" smtClean="0"/>
+              <a:rPr lang="en-US" dirty="0"/>
               <a:t>Writing</a:t>
             </a:r>
           </a:p>
@@ -10090,7 +10158,7 @@
               </a:spcBef>
             </a:pPr>
             <a:r>
-              <a:rPr lang="en-US" dirty="0" smtClean="0"/>
+              <a:rPr lang="en-US" dirty="0"/>
               <a:t>Lessons learning: Each team member learns more on working in team.</a:t>
             </a:r>
           </a:p>
@@ -10105,11 +10173,7 @@
             </a:pPr>
             <a:r>
               <a:rPr lang="en-US" dirty="0"/>
-              <a:t>B</a:t>
-            </a:r>
-            <a:r>
-              <a:rPr lang="en-US" dirty="0" smtClean="0"/>
-              <a:t>rainstorming process </a:t>
+              <a:t>Brainstorming process </a:t>
             </a:r>
           </a:p>
           <a:p>
@@ -10122,7 +10186,7 @@
               </a:spcBef>
             </a:pPr>
             <a:r>
-              <a:rPr lang="en-US" dirty="0" smtClean="0"/>
+              <a:rPr lang="en-US" dirty="0"/>
               <a:t>Designing </a:t>
             </a:r>
           </a:p>
@@ -10137,11 +10201,7 @@
             </a:pPr>
             <a:r>
               <a:rPr lang="en-US" dirty="0"/>
-              <a:t>D</a:t>
-            </a:r>
-            <a:r>
-              <a:rPr lang="en-US" dirty="0" smtClean="0"/>
-              <a:t>ecision making </a:t>
+              <a:t>Decision making </a:t>
             </a:r>
           </a:p>
           <a:p>
@@ -10155,11 +10215,7 @@
             </a:pPr>
             <a:r>
               <a:rPr lang="en-US" dirty="0"/>
-              <a:t>I</a:t>
-            </a:r>
-            <a:r>
-              <a:rPr lang="en-US" dirty="0" smtClean="0"/>
-              <a:t>ssues troubleshooting</a:t>
+              <a:t>Issues troubleshooting</a:t>
             </a:r>
           </a:p>
           <a:p>
@@ -10172,10 +10228,9 @@
               </a:spcBef>
             </a:pPr>
             <a:r>
-              <a:rPr lang="en-US" dirty="0" smtClean="0"/>
+              <a:rPr lang="en-US" dirty="0"/>
               <a:t>Documentation</a:t>
             </a:r>
-            <a:endParaRPr lang="en-US" dirty="0"/>
           </a:p>
           <a:p>
             <a:pPr lvl="1">
@@ -10187,7 +10242,7 @@
               </a:spcBef>
             </a:pPr>
             <a:r>
-              <a:rPr lang="en-US" dirty="0" smtClean="0"/>
+              <a:rPr lang="en-US" dirty="0"/>
               <a:t>Communication</a:t>
             </a:r>
           </a:p>
@@ -10239,10 +10294,9 @@
           <a:lstStyle/>
           <a:p>
             <a:r>
-              <a:rPr lang="en-US" dirty="0" smtClean="0"/>
+              <a:rPr lang="en-US" dirty="0"/>
               <a:t>Thank you</a:t>
             </a:r>
-            <a:endParaRPr lang="en-US" dirty="0"/>
           </a:p>
         </p:txBody>
       </p:sp>
@@ -10275,13 +10329,6 @@
   <p:clrMapOvr>
     <a:masterClrMapping/>
   </p:clrMapOvr>
-  <p:timing>
-    <p:tnLst>
-      <p:par>
-        <p:cTn id="1" dur="indefinite" restart="never" nodeType="tmRoot"/>
-      </p:par>
-    </p:tnLst>
-  </p:timing>
 </p:sld>
 </file>
 
@@ -10318,10 +10365,9 @@
           <a:lstStyle/>
           <a:p>
             <a:r>
-              <a:rPr lang="en-US" dirty="0" smtClean="0"/>
+              <a:rPr lang="en-US" dirty="0"/>
               <a:t>Objective</a:t>
             </a:r>
-            <a:endParaRPr lang="en-US" dirty="0"/>
           </a:p>
         </p:txBody>
       </p:sp>
@@ -10350,100 +10396,72 @@
             <a:pPr algn="just"/>
             <a:r>
               <a:rPr lang="en-US" dirty="0"/>
-              <a:t>The </a:t>
-            </a:r>
-            <a:r>
-              <a:rPr lang="en-US" dirty="0" smtClean="0"/>
-              <a:t>overall objective </a:t>
-            </a:r>
+              <a:t>The overall objective of this project is designing and prototyping an elegant lockbox. The locking feature should not be the most distinguishing feature yet still be a secured box of storing items.</a:t>
+            </a:r>
+          </a:p>
+          <a:p>
             <a:r>
               <a:rPr lang="en-US" dirty="0"/>
-              <a:t>of this project is </a:t>
-            </a:r>
-            <a:r>
-              <a:rPr lang="en-US" dirty="0" smtClean="0"/>
-              <a:t>designing and prototyping an elegant lockbox. The locking feature should </a:t>
-            </a:r>
+              <a:t>Design</a:t>
+            </a:r>
+          </a:p>
+          <a:p>
+            <a:pPr lvl="1"/>
             <a:r>
               <a:rPr lang="en-US" dirty="0"/>
-              <a:t>not be the most distinguishing </a:t>
-            </a:r>
-            <a:r>
-              <a:rPr lang="en-US" dirty="0" smtClean="0"/>
-              <a:t>feature yet still be a secured box of </a:t>
-            </a:r>
+              <a:t>PCB</a:t>
+            </a:r>
+          </a:p>
+          <a:p>
+            <a:pPr lvl="1"/>
             <a:r>
               <a:rPr lang="en-US" dirty="0"/>
-              <a:t>storing items.</a:t>
-            </a:r>
-          </a:p>
-          <a:p>
-            <a:r>
-              <a:rPr lang="en-US" dirty="0" smtClean="0"/>
-              <a:t>Design</a:t>
+              <a:t>Unlock program</a:t>
             </a:r>
           </a:p>
           <a:p>
             <a:pPr lvl="1"/>
             <a:r>
-              <a:rPr lang="en-US" dirty="0" smtClean="0"/>
-              <a:t>PCB</a:t>
+              <a:rPr lang="en-US" dirty="0"/>
+              <a:t>Box</a:t>
+            </a:r>
+          </a:p>
+          <a:p>
+            <a:r>
+              <a:rPr lang="en-US" dirty="0"/>
+              <a:t>Prototype</a:t>
             </a:r>
           </a:p>
           <a:p>
             <a:pPr lvl="1"/>
             <a:r>
-              <a:rPr lang="en-US" dirty="0" smtClean="0"/>
-              <a:t>Unlock program</a:t>
+              <a:rPr lang="en-US" dirty="0"/>
+              <a:t>Hardware box</a:t>
+            </a:r>
+          </a:p>
+          <a:p>
+            <a:r>
+              <a:rPr lang="en-US" dirty="0"/>
+              <a:t>Test</a:t>
             </a:r>
           </a:p>
           <a:p>
             <a:pPr lvl="1"/>
             <a:r>
-              <a:rPr lang="en-US" dirty="0" smtClean="0"/>
-              <a:t>Box</a:t>
-            </a:r>
-          </a:p>
-          <a:p>
-            <a:r>
-              <a:rPr lang="en-US" dirty="0" smtClean="0"/>
-              <a:t>Prototype</a:t>
+              <a:rPr lang="en-US" dirty="0"/>
+              <a:t>Input correct code/unlocks/disable</a:t>
             </a:r>
           </a:p>
           <a:p>
             <a:pPr lvl="1"/>
             <a:r>
               <a:rPr lang="en-US" dirty="0"/>
-              <a:t>H</a:t>
-            </a:r>
-            <a:r>
-              <a:rPr lang="en-US" dirty="0" smtClean="0"/>
-              <a:t>ardware box</a:t>
-            </a:r>
-          </a:p>
-          <a:p>
-            <a:r>
-              <a:rPr lang="en-US" dirty="0" smtClean="0"/>
-              <a:t>Test</a:t>
+              <a:t>Input incorrect code/disable</a:t>
             </a:r>
           </a:p>
           <a:p>
             <a:pPr lvl="1"/>
-            <a:r>
-              <a:rPr lang="en-US" dirty="0" smtClean="0"/>
-              <a:t>Input correct code/unlocks/disable</a:t>
-            </a:r>
-          </a:p>
-          <a:p>
-            <a:pPr lvl="1"/>
-            <a:r>
-              <a:rPr lang="en-US" dirty="0" smtClean="0"/>
-              <a:t>Input incorrect code/disable</a:t>
-            </a:r>
-          </a:p>
-          <a:p>
-            <a:pPr lvl="1"/>
-            <a:endParaRPr lang="en-US" dirty="0" smtClean="0"/>
+            <a:endParaRPr lang="en-US" dirty="0"/>
           </a:p>
         </p:txBody>
       </p:sp>
@@ -10457,13 +10475,6 @@
   <p:clrMapOvr>
     <a:masterClrMapping/>
   </p:clrMapOvr>
-  <p:timing>
-    <p:tnLst>
-      <p:par>
-        <p:cTn id="1" dur="indefinite" restart="never" nodeType="tmRoot"/>
-      </p:par>
-    </p:tnLst>
-  </p:timing>
 </p:sld>
 </file>
 
@@ -10500,10 +10511,9 @@
           <a:lstStyle/>
           <a:p>
             <a:r>
-              <a:rPr lang="en-US" dirty="0" smtClean="0"/>
+              <a:rPr lang="en-US" dirty="0"/>
               <a:t>Alternatives</a:t>
             </a:r>
-            <a:endParaRPr lang="en-US" dirty="0"/>
           </a:p>
         </p:txBody>
       </p:sp>
@@ -10523,7 +10533,7 @@
           <a:lstStyle/>
           <a:p>
             <a:r>
-              <a:rPr lang="en-US" dirty="0" smtClean="0"/>
+              <a:rPr lang="en-US" dirty="0"/>
               <a:t>Conventional lock box</a:t>
             </a:r>
           </a:p>
@@ -10801,10 +10811,9 @@
           <a:lstStyle/>
           <a:p>
             <a:r>
-              <a:rPr lang="en-US" dirty="0" smtClean="0"/>
+              <a:rPr lang="en-US" dirty="0"/>
               <a:t>Requirements </a:t>
             </a:r>
-            <a:endParaRPr lang="en-US" dirty="0"/>
           </a:p>
         </p:txBody>
       </p:sp>
@@ -10819,7 +10828,7 @@
           </p:nvPr>
         </p:nvPicPr>
         <p:blipFill>
-          <a:blip r:embed="rId2">
+          <a:blip r:embed="rId2" cstate="print">
             <a:extLst>
               <a:ext uri="{28A0092B-C50C-407E-A947-70E740481C1C}">
                 <a14:useLocalDpi xmlns:a14="http://schemas.microsoft.com/office/drawing/2010/main" val="0"/>
@@ -10848,7 +10857,7 @@
           </p:nvPr>
         </p:nvPicPr>
         <p:blipFill>
-          <a:blip r:embed="rId3">
+          <a:blip r:embed="rId3" cstate="print">
             <a:extLst>
               <a:ext uri="{28A0092B-C50C-407E-A947-70E740481C1C}">
                 <a14:useLocalDpi xmlns:a14="http://schemas.microsoft.com/office/drawing/2010/main" val="0"/>
@@ -10876,13 +10885,6 @@
   <p:clrMapOvr>
     <a:masterClrMapping/>
   </p:clrMapOvr>
-  <p:timing>
-    <p:tnLst>
-      <p:par>
-        <p:cTn id="1" dur="indefinite" restart="never" nodeType="tmRoot"/>
-      </p:par>
-    </p:tnLst>
-  </p:timing>
 </p:sld>
 </file>
 
@@ -10919,10 +10921,9 @@
           <a:lstStyle/>
           <a:p>
             <a:r>
-              <a:rPr lang="en-US" dirty="0" smtClean="0"/>
+              <a:rPr lang="en-US" dirty="0"/>
               <a:t>Approach</a:t>
             </a:r>
-            <a:endParaRPr lang="en-US" dirty="0"/>
           </a:p>
         </p:txBody>
       </p:sp>
@@ -10950,56 +10951,15 @@
           <a:p>
             <a:pPr algn="just"/>
             <a:r>
-              <a:rPr lang="en-US" dirty="0" smtClean="0"/>
-              <a:t>Useless machine feature incorporation: Simple box with a </a:t>
-            </a:r>
-            <a:r>
               <a:rPr lang="en-US" dirty="0"/>
-              <a:t>switch and a moving arm. When the switch is </a:t>
-            </a:r>
-            <a:r>
-              <a:rPr lang="en-US" dirty="0" smtClean="0"/>
-              <a:t>flipped, </a:t>
-            </a:r>
+              <a:t>Useless machine feature incorporation: Simple box with a switch and a moving arm. When the switch is flipped, the arm moves and flips the switch back to the starting position. </a:t>
+            </a:r>
+          </a:p>
+          <a:p>
+            <a:pPr algn="just"/>
             <a:r>
               <a:rPr lang="en-US" dirty="0"/>
-              <a:t>the arm moves and flips the switch back to the starting position. </a:t>
-            </a:r>
-            <a:endParaRPr lang="en-US" dirty="0" smtClean="0"/>
-          </a:p>
-          <a:p>
-            <a:pPr algn="just"/>
-            <a:r>
-              <a:rPr lang="en-US" dirty="0" smtClean="0"/>
-              <a:t>Lock box feature: </a:t>
-            </a:r>
-            <a:r>
-              <a:rPr lang="en-US" dirty="0"/>
-              <a:t>The switch will enable a </a:t>
-            </a:r>
-            <a:r>
-              <a:rPr lang="en-US" dirty="0" smtClean="0"/>
-              <a:t>keypad. </a:t>
-            </a:r>
-            <a:r>
-              <a:rPr lang="en-US" dirty="0"/>
-              <a:t>If the correct </a:t>
-            </a:r>
-            <a:r>
-              <a:rPr lang="en-US" dirty="0" smtClean="0"/>
-              <a:t>passcode </a:t>
-            </a:r>
-            <a:r>
-              <a:rPr lang="en-US" dirty="0"/>
-              <a:t>is entered a solenoid will activate and the “hidden” lockbox compartment will open. If the </a:t>
-            </a:r>
-            <a:r>
-              <a:rPr lang="en-US" dirty="0" smtClean="0"/>
-              <a:t>passcode </a:t>
-            </a:r>
-            <a:r>
-              <a:rPr lang="en-US" dirty="0"/>
-              <a:t>is incorrect a moving arm will flip the switch back to the off position.</a:t>
+              <a:t>Lock box feature: The switch will enable a keypad. If the correct passcode is entered a solenoid will activate and the “hidden” lockbox compartment will open. If the passcode is incorrect a moving arm will flip the switch back to the off position.</a:t>
             </a:r>
           </a:p>
           <a:p>
@@ -11086,10 +11046,9 @@
           <a:lstStyle/>
           <a:p>
             <a:r>
-              <a:rPr lang="en-US" dirty="0" smtClean="0"/>
+              <a:rPr lang="en-US" dirty="0"/>
               <a:t>Approach</a:t>
             </a:r>
-            <a:endParaRPr lang="en-US" dirty="0"/>
           </a:p>
         </p:txBody>
       </p:sp>
@@ -11116,72 +11075,72 @@
           <a:lstStyle/>
           <a:p>
             <a:r>
-              <a:rPr lang="en-US" dirty="0" smtClean="0"/>
+              <a:rPr lang="en-US" dirty="0"/>
               <a:t>Split </a:t>
             </a:r>
             <a:r>
-              <a:rPr lang="en-US" sz="2600" dirty="0" smtClean="0"/>
+              <a:rPr lang="en-US" sz="2600" dirty="0"/>
               <a:t>hardware and software</a:t>
             </a:r>
           </a:p>
           <a:p>
             <a:r>
-              <a:rPr lang="en-US" sz="2600" dirty="0" smtClean="0"/>
+              <a:rPr lang="en-US" sz="2600" dirty="0"/>
               <a:t>ATmega328P microprocessor interactions:</a:t>
             </a:r>
           </a:p>
           <a:p>
             <a:pPr lvl="1"/>
             <a:r>
-              <a:rPr lang="en-US" sz="2600" dirty="0" smtClean="0"/>
+              <a:rPr lang="en-US" sz="2600" dirty="0"/>
               <a:t>LCD		</a:t>
             </a:r>
           </a:p>
           <a:p>
             <a:pPr lvl="1"/>
             <a:r>
-              <a:rPr lang="en-US" sz="2600" dirty="0" smtClean="0"/>
+              <a:rPr lang="en-US" sz="2600" dirty="0"/>
               <a:t>Keypad</a:t>
             </a:r>
           </a:p>
           <a:p>
             <a:pPr lvl="1"/>
             <a:r>
-              <a:rPr lang="en-US" sz="2600" dirty="0" smtClean="0"/>
+              <a:rPr lang="en-US" sz="2600" dirty="0"/>
               <a:t>Servo</a:t>
             </a:r>
           </a:p>
           <a:p>
             <a:pPr lvl="1"/>
             <a:r>
-              <a:rPr lang="en-US" sz="2600" dirty="0" smtClean="0"/>
+              <a:rPr lang="en-US" sz="2600" dirty="0"/>
               <a:t>Solenoid</a:t>
             </a:r>
           </a:p>
           <a:p>
             <a:pPr lvl="1"/>
             <a:r>
-              <a:rPr lang="en-US" sz="2600" dirty="0" smtClean="0"/>
+              <a:rPr lang="en-US" sz="2600" dirty="0"/>
               <a:t>Switch</a:t>
             </a:r>
           </a:p>
           <a:p>
             <a:r>
-              <a:rPr lang="en-US" sz="2600" dirty="0" smtClean="0"/>
+              <a:rPr lang="en-US" sz="2600" dirty="0"/>
               <a:t>Hardware</a:t>
             </a:r>
           </a:p>
           <a:p>
             <a:pPr lvl="1"/>
             <a:r>
-              <a:rPr lang="en-US" sz="2600" dirty="0" smtClean="0"/>
+              <a:rPr lang="en-US" sz="2600" dirty="0"/>
               <a:t>Box/Door</a:t>
             </a:r>
           </a:p>
           <a:p>
             <a:pPr lvl="1"/>
             <a:r>
-              <a:rPr lang="en-US" sz="2600" dirty="0" smtClean="0"/>
+              <a:rPr lang="en-US" sz="2600" dirty="0"/>
               <a:t>PCB</a:t>
             </a:r>
           </a:p>
@@ -11240,17 +11199,16 @@
           <a:lstStyle/>
           <a:p>
             <a:r>
-              <a:rPr lang="en-US" dirty="0" smtClean="0"/>
+              <a:rPr lang="en-US" dirty="0"/>
               <a:t>Project </a:t>
             </a:r>
             <a:br>
-              <a:rPr lang="en-US" dirty="0" smtClean="0"/>
+              <a:rPr lang="en-US" dirty="0"/>
             </a:br>
             <a:r>
-              <a:rPr lang="en-US" dirty="0" smtClean="0"/>
+              <a:rPr lang="en-US" dirty="0"/>
               <a:t>Schedule</a:t>
             </a:r>
-            <a:endParaRPr lang="en-US" dirty="0"/>
           </a:p>
         </p:txBody>
       </p:sp>
@@ -11265,7 +11223,7 @@
           </p:nvPr>
         </p:nvPicPr>
         <p:blipFill>
-          <a:blip r:embed="rId2">
+          <a:blip r:embed="rId2" cstate="print">
             <a:extLst>
               <a:ext uri="{28A0092B-C50C-407E-A947-70E740481C1C}">
                 <a14:useLocalDpi xmlns:a14="http://schemas.microsoft.com/office/drawing/2010/main" val="0"/>
@@ -11329,10 +11287,9 @@
           <a:lstStyle/>
           <a:p>
             <a:r>
-              <a:rPr lang="en-US" dirty="0" smtClean="0"/>
+              <a:rPr lang="en-US" dirty="0"/>
               <a:t>Design Process</a:t>
             </a:r>
-            <a:endParaRPr lang="en-US" dirty="0"/>
           </a:p>
         </p:txBody>
       </p:sp>
@@ -11359,72 +11316,72 @@
           <a:lstStyle/>
           <a:p>
             <a:r>
-              <a:rPr lang="en-US" dirty="0" smtClean="0"/>
+              <a:rPr lang="en-US" dirty="0"/>
               <a:t>Atmega328P IDE:</a:t>
             </a:r>
           </a:p>
           <a:p>
             <a:pPr lvl="1"/>
             <a:r>
-              <a:rPr lang="en-US" sz="2400" dirty="0" smtClean="0"/>
+              <a:rPr lang="en-US" sz="2400" dirty="0"/>
               <a:t>Visual studio + AVR Dragon</a:t>
             </a:r>
           </a:p>
           <a:p>
             <a:r>
-              <a:rPr lang="en-US" dirty="0" smtClean="0"/>
+              <a:rPr lang="en-US" dirty="0"/>
               <a:t>Software coding:</a:t>
             </a:r>
           </a:p>
           <a:p>
             <a:pPr lvl="1"/>
             <a:r>
-              <a:rPr lang="en-US" sz="2400" dirty="0" smtClean="0"/>
+              <a:rPr lang="en-US" sz="2400" dirty="0"/>
               <a:t>LCD: 4 bits interactions</a:t>
             </a:r>
           </a:p>
           <a:p>
             <a:pPr lvl="1"/>
             <a:r>
-              <a:rPr lang="en-US" sz="2400" dirty="0" smtClean="0"/>
+              <a:rPr lang="en-US" sz="2400" dirty="0"/>
               <a:t>Servo: 16bits counter and interrupt service to produce PWM</a:t>
             </a:r>
           </a:p>
           <a:p>
             <a:pPr lvl="1"/>
             <a:r>
-              <a:rPr lang="en-US" sz="2400" dirty="0" smtClean="0"/>
+              <a:rPr lang="en-US" sz="2400" dirty="0"/>
               <a:t>Keypad: matrix keypad</a:t>
             </a:r>
           </a:p>
           <a:p>
             <a:r>
-              <a:rPr lang="en-US" dirty="0" smtClean="0"/>
+              <a:rPr lang="en-US" dirty="0"/>
               <a:t>Hardware:</a:t>
             </a:r>
           </a:p>
           <a:p>
             <a:pPr lvl="1"/>
             <a:r>
-              <a:rPr lang="en-US" sz="2400" dirty="0" smtClean="0"/>
+              <a:rPr lang="en-US" sz="2400" dirty="0"/>
               <a:t>PCB: Eagle and </a:t>
             </a:r>
             <a:r>
-              <a:rPr lang="en-US" sz="2400" dirty="0" err="1" smtClean="0"/>
+              <a:rPr lang="en-US" sz="2400" dirty="0" err="1"/>
               <a:t>Oshpark</a:t>
             </a:r>
-            <a:endParaRPr lang="en-US" sz="2400" dirty="0" smtClean="0"/>
+            <a:endParaRPr lang="en-US" sz="2400" dirty="0"/>
           </a:p>
           <a:p>
             <a:pPr lvl="1"/>
             <a:r>
-              <a:rPr lang="en-US" sz="2400" dirty="0" smtClean="0"/>
+              <a:rPr lang="en-US" sz="2400" dirty="0"/>
               <a:t>Box: SOLIDWORK and Laser cutter in L.I.D</a:t>
             </a:r>
           </a:p>
           <a:p>
             <a:pPr lvl="1"/>
-            <a:endParaRPr lang="en-US" sz="2400" dirty="0" smtClean="0"/>
+            <a:endParaRPr lang="en-US" sz="2400" dirty="0"/>
           </a:p>
         </p:txBody>
       </p:sp>
@@ -11438,13 +11395,6 @@
   <p:clrMapOvr>
     <a:masterClrMapping/>
   </p:clrMapOvr>
-  <p:timing>
-    <p:tnLst>
-      <p:par>
-        <p:cTn id="1" dur="indefinite" restart="never" nodeType="tmRoot"/>
-      </p:par>
-    </p:tnLst>
-  </p:timing>
 </p:sld>
 </file>
 

</xml_diff>